<commit_message>
Added TX filter lecture nodes and problems MATLAB still to be added
</commit_message>
<xml_diff>
--- a/Lectures/CourseAdmin.pptx
+++ b/Lectures/CourseAdmin.pptx
@@ -13,7 +13,7 @@
     <p:sldId id="402" r:id="rId4"/>
     <p:sldId id="406" r:id="rId5"/>
     <p:sldId id="403" r:id="rId6"/>
-    <p:sldId id="404" r:id="rId7"/>
+    <p:sldId id="414" r:id="rId7"/>
     <p:sldId id="413" r:id="rId8"/>
     <p:sldId id="400" r:id="rId9"/>
     <p:sldId id="411" r:id="rId10"/>
@@ -221,7 +221,7 @@
           <a:p>
             <a:fld id="{B7D6DDD3-D7E9-488B-B626-1E8285E424D8}" type="datetimeFigureOut">
               <a:rPr lang="en-US" smtClean="0"/>
-              <a:t>1/27/2019</a:t>
+              <a:t>1/29/2019</a:t>
             </a:fld>
             <a:endParaRPr lang="en-US"/>
           </a:p>
@@ -5877,8 +5877,8 @@
         </p:blipFill>
         <p:spPr>
           <a:xfrm>
-            <a:off x="7849721" y="2749923"/>
-            <a:ext cx="3659076" cy="3024747"/>
+            <a:off x="7819241" y="3142916"/>
+            <a:ext cx="3525415" cy="2914257"/>
           </a:xfrm>
           <a:prstGeom prst="rect">
             <a:avLst/>
@@ -6162,7 +6162,7 @@
           <a:p>
             <a:r>
               <a:rPr lang="en-US" dirty="0"/>
-              <a:t>Class will Follow this Block Diagram</a:t>
+              <a:t>Class will Follow This Diagram</a:t>
             </a:r>
           </a:p>
         </p:txBody>
@@ -6262,8 +6262,8 @@
         </p:nvSpPr>
         <p:spPr>
           <a:xfrm>
-            <a:off x="2477965" y="1944147"/>
-            <a:ext cx="448649" cy="307777"/>
+            <a:off x="2335557" y="1676377"/>
+            <a:ext cx="956890" cy="523220"/>
           </a:xfrm>
           <a:prstGeom prst="rect">
             <a:avLst/>
@@ -6271,14 +6271,14 @@
           <a:noFill/>
         </p:spPr>
         <p:txBody>
-          <a:bodyPr wrap="none" rtlCol="0">
+          <a:bodyPr wrap="square" rtlCol="0">
             <a:spAutoFit/>
           </a:bodyPr>
           <a:lstStyle/>
           <a:p>
             <a:r>
               <a:rPr lang="en-US" sz="1400" dirty="0"/>
-              <a:t>FEC</a:t>
+              <a:t>Channel coding</a:t>
             </a:r>
             <a:endParaRPr lang="en-US" dirty="0"/>
           </a:p>
@@ -6435,7 +6435,7 @@
         </p:nvSpPr>
         <p:spPr>
           <a:xfrm>
-            <a:off x="3145282" y="1862834"/>
+            <a:off x="3183157" y="2960134"/>
             <a:ext cx="717087" cy="523220"/>
           </a:xfrm>
           <a:prstGeom prst="rect">
@@ -6450,7 +6450,7 @@
           <a:lstStyle/>
           <a:p>
             <a:r>
-              <a:rPr lang="en-US" sz="1400" dirty="0"/>
+              <a:rPr lang="en-US" sz="1400" i="1" dirty="0"/>
               <a:t>Coded bits</a:t>
             </a:r>
           </a:p>
@@ -6538,7 +6538,7 @@
           <a:p>
             <a:r>
               <a:rPr lang="en-US" sz="1400" dirty="0"/>
-              <a:t>TX filtering</a:t>
+              <a:t>TX filter DAC</a:t>
             </a:r>
           </a:p>
         </p:txBody>
@@ -6600,7 +6600,7 @@
         </p:nvSpPr>
         <p:spPr>
           <a:xfrm>
-            <a:off x="5224992" y="1884257"/>
+            <a:off x="5134438" y="2960134"/>
             <a:ext cx="867872" cy="523220"/>
           </a:xfrm>
           <a:prstGeom prst="rect">
@@ -6615,7 +6615,7 @@
           <a:lstStyle/>
           <a:p>
             <a:r>
-              <a:rPr lang="en-US" sz="1400" dirty="0"/>
+              <a:rPr lang="en-US" sz="1400" i="1" dirty="0"/>
               <a:t>IQ symbols</a:t>
             </a:r>
           </a:p>
@@ -6638,9 +6638,9 @@
           <p:nvPr/>
         </p:nvCxnSpPr>
         <p:spPr>
-          <a:xfrm>
-            <a:off x="7217983" y="2453110"/>
-            <a:ext cx="846901" cy="1"/>
+          <a:xfrm flipV="1">
+            <a:off x="7217983" y="2453109"/>
+            <a:ext cx="1129399" cy="1"/>
           </a:xfrm>
           <a:prstGeom prst="straightConnector1">
             <a:avLst/>
@@ -6678,7 +6678,7 @@
         </p:nvSpPr>
         <p:spPr>
           <a:xfrm>
-            <a:off x="8064884" y="2232149"/>
+            <a:off x="8347382" y="2232147"/>
             <a:ext cx="718906" cy="441923"/>
           </a:xfrm>
           <a:prstGeom prst="rect">
@@ -6730,8 +6730,8 @@
         </p:nvSpPr>
         <p:spPr>
           <a:xfrm>
-            <a:off x="7291127" y="1765866"/>
-            <a:ext cx="761470" cy="523220"/>
+            <a:off x="7229974" y="3000096"/>
+            <a:ext cx="950322" cy="523220"/>
           </a:xfrm>
           <a:prstGeom prst="rect">
             <a:avLst/>
@@ -6745,8 +6745,8 @@
           <a:lstStyle/>
           <a:p>
             <a:r>
-              <a:rPr lang="en-US" sz="1400" dirty="0"/>
-              <a:t>Analog BB</a:t>
+              <a:rPr lang="en-US" sz="1400" i="1" dirty="0"/>
+              <a:t>Analog baseband</a:t>
             </a:r>
           </a:p>
         </p:txBody>
@@ -6765,7 +6765,7 @@
         </p:nvSpPr>
         <p:spPr>
           <a:xfrm>
-            <a:off x="7876032" y="1844125"/>
+            <a:off x="8158530" y="1844123"/>
             <a:ext cx="1176528" cy="307777"/>
           </a:xfrm>
           <a:prstGeom prst="rect">
@@ -6842,7 +6842,7 @@
         </p:nvSpPr>
         <p:spPr>
           <a:xfrm>
-            <a:off x="1635716" y="1862834"/>
+            <a:off x="1569227" y="2934356"/>
             <a:ext cx="717087" cy="523220"/>
           </a:xfrm>
           <a:prstGeom prst="rect">
@@ -6857,7 +6857,7 @@
           <a:lstStyle/>
           <a:p>
             <a:r>
-              <a:rPr lang="en-US" sz="1400" dirty="0"/>
+              <a:rPr lang="en-US" sz="1400" i="1" dirty="0"/>
               <a:t>Info bits</a:t>
             </a:r>
           </a:p>
@@ -6877,7 +6877,7 @@
         </p:nvSpPr>
         <p:spPr>
           <a:xfrm>
-            <a:off x="9503540" y="3034716"/>
+            <a:off x="10145702" y="2957863"/>
             <a:ext cx="718906" cy="851898"/>
           </a:xfrm>
           <a:prstGeom prst="rect">
@@ -6929,7 +6929,7 @@
         </p:nvSpPr>
         <p:spPr>
           <a:xfrm>
-            <a:off x="10222446" y="3276732"/>
+            <a:off x="10885466" y="3122202"/>
             <a:ext cx="1176528" cy="523220"/>
           </a:xfrm>
           <a:prstGeom prst="rect">
@@ -6970,7 +6970,7 @@
         </p:nvSpPr>
         <p:spPr>
           <a:xfrm rot="10800000">
-            <a:off x="9100179" y="1837907"/>
+            <a:off x="9382677" y="1837905"/>
             <a:ext cx="403361" cy="242928"/>
           </a:xfrm>
           <a:prstGeom prst="triangle">
@@ -7020,7 +7020,7 @@
         </p:nvCxnSpPr>
         <p:spPr>
           <a:xfrm flipV="1">
-            <a:off x="8783790" y="2080835"/>
+            <a:off x="9066288" y="2080833"/>
             <a:ext cx="518069" cy="372276"/>
           </a:xfrm>
           <a:prstGeom prst="bentConnector2">
@@ -7056,7 +7056,7 @@
         </p:nvSpPr>
         <p:spPr>
           <a:xfrm>
-            <a:off x="8064884" y="4647818"/>
+            <a:off x="8347382" y="4647816"/>
             <a:ext cx="718906" cy="441923"/>
           </a:xfrm>
           <a:prstGeom prst="rect">
@@ -7108,7 +7108,7 @@
         </p:nvSpPr>
         <p:spPr>
           <a:xfrm>
-            <a:off x="7967348" y="5169074"/>
+            <a:off x="8279937" y="5143775"/>
             <a:ext cx="1176528" cy="523220"/>
           </a:xfrm>
           <a:prstGeom prst="rect">
@@ -7143,7 +7143,7 @@
         </p:nvSpPr>
         <p:spPr>
           <a:xfrm rot="10800000">
-            <a:off x="9100179" y="4253576"/>
+            <a:off x="9382677" y="4253574"/>
             <a:ext cx="403361" cy="242928"/>
           </a:xfrm>
           <a:prstGeom prst="triangle">
@@ -7193,7 +7193,7 @@
         </p:nvCxnSpPr>
         <p:spPr>
           <a:xfrm flipV="1">
-            <a:off x="8783790" y="4496504"/>
+            <a:off x="9066288" y="4496502"/>
             <a:ext cx="518069" cy="372276"/>
           </a:xfrm>
           <a:prstGeom prst="bentConnector2">
@@ -7282,7 +7282,7 @@
         <p:spPr>
           <a:xfrm>
             <a:off x="6444358" y="5165570"/>
-            <a:ext cx="1176528" cy="307777"/>
+            <a:ext cx="1176528" cy="523220"/>
           </a:xfrm>
           <a:prstGeom prst="rect">
             <a:avLst/>
@@ -7298,6 +7298,13 @@
             <a:r>
               <a:rPr lang="en-US" sz="1400" dirty="0"/>
               <a:t>RX filter</a:t>
+            </a:r>
+            <a:br>
+              <a:rPr lang="en-US" sz="1400" dirty="0"/>
+            </a:br>
+            <a:r>
+              <a:rPr lang="en-US" sz="1400" dirty="0"/>
+              <a:t>and ADC</a:t>
             </a:r>
           </a:p>
         </p:txBody>
@@ -7637,7 +7644,7 @@
         </p:nvSpPr>
         <p:spPr>
           <a:xfrm>
-            <a:off x="2379169" y="5223240"/>
+            <a:off x="2290766" y="5221383"/>
             <a:ext cx="869666" cy="523220"/>
           </a:xfrm>
           <a:prstGeom prst="rect">
@@ -7725,7 +7732,7 @@
         <p:spPr>
           <a:xfrm flipH="1" flipV="1">
             <a:off x="7217983" y="4866923"/>
-            <a:ext cx="846901" cy="1857"/>
+            <a:ext cx="1129399" cy="1855"/>
           </a:xfrm>
           <a:prstGeom prst="straightConnector1">
             <a:avLst/>
@@ -7959,10 +7966,45 @@
           </a:fontRef>
         </p:style>
       </p:cxnSp>
+      <p:sp>
+        <p:nvSpPr>
+          <p:cNvPr id="50" name="TextBox 49">
+            <a:extLst>
+              <a:ext uri="{FF2B5EF4-FFF2-40B4-BE49-F238E27FC236}">
+                <a16:creationId xmlns:a16="http://schemas.microsoft.com/office/drawing/2014/main" id="{00F44898-F2C0-4FC6-9510-D74828ED62DC}"/>
+              </a:ext>
+            </a:extLst>
+          </p:cNvPr>
+          <p:cNvSpPr txBox="1"/>
+          <p:nvPr/>
+        </p:nvSpPr>
+        <p:spPr>
+          <a:xfrm>
+            <a:off x="9358170" y="2990690"/>
+            <a:ext cx="518069" cy="307777"/>
+          </a:xfrm>
+          <a:prstGeom prst="rect">
+            <a:avLst/>
+          </a:prstGeom>
+          <a:noFill/>
+        </p:spPr>
+        <p:txBody>
+          <a:bodyPr wrap="square" rtlCol="0">
+            <a:spAutoFit/>
+          </a:bodyPr>
+          <a:lstStyle/>
+          <a:p>
+            <a:r>
+              <a:rPr lang="en-US" sz="1400" i="1" dirty="0"/>
+              <a:t>RF</a:t>
+            </a:r>
+          </a:p>
+        </p:txBody>
+      </p:sp>
     </p:spTree>
     <p:extLst>
       <p:ext uri="{BB962C8B-B14F-4D97-AF65-F5344CB8AC3E}">
-        <p14:creationId xmlns:p14="http://schemas.microsoft.com/office/powerpoint/2010/main" val="4112511068"/>
+        <p14:creationId xmlns:p14="http://schemas.microsoft.com/office/powerpoint/2010/main" val="4096089804"/>
       </p:ext>
     </p:extLst>
   </p:cSld>
@@ -9876,7 +9918,7 @@
             <a:pPr lvl="1"/>
             <a:r>
               <a:rPr lang="en-US" dirty="0"/>
-              <a:t>30% homework, labs and quizzes, 35% midterm, 35% final</a:t>
+              <a:t>30% homework, labs and quizzes, 10% final project, 30% midterm, 30% final</a:t>
             </a:r>
           </a:p>
           <a:p>
@@ -9986,7 +10028,7 @@
           <a:p>
             <a:r>
               <a:rPr lang="en-US" dirty="0"/>
-              <a:t>Optional Project</a:t>
+              <a:t>Final Project</a:t>
             </a:r>
           </a:p>
         </p:txBody>
@@ -10009,38 +10051,81 @@
         </p:nvSpPr>
         <p:spPr/>
         <p:txBody>
-          <a:bodyPr/>
+          <a:bodyPr>
+            <a:normAutofit fontScale="92500" lnSpcReduction="10000"/>
+          </a:bodyPr>
           <a:lstStyle/>
           <a:p>
             <a:r>
               <a:rPr lang="en-US" dirty="0"/>
+              <a:t>You will simulate an end-to-end system of your choice</a:t>
+            </a:r>
+          </a:p>
+          <a:p>
+            <a:r>
+              <a:rPr lang="en-US" dirty="0"/>
+              <a:t>Example:</a:t>
+            </a:r>
+          </a:p>
+          <a:p>
+            <a:pPr lvl="1"/>
+            <a:r>
+              <a:rPr lang="en-US" dirty="0"/>
+              <a:t>802.11ad, LTE, 5G, …</a:t>
+            </a:r>
+          </a:p>
+          <a:p>
+            <a:r>
+              <a:rPr lang="en-US" dirty="0"/>
+              <a:t>Your project should comprehensively test at least one component</a:t>
+            </a:r>
+          </a:p>
+          <a:p>
+            <a:pPr lvl="1"/>
+            <a:r>
+              <a:rPr lang="en-US" dirty="0"/>
+              <a:t>Ex:  equalization, effect of phase noise, …</a:t>
+            </a:r>
+          </a:p>
+          <a:p>
+            <a:r>
+              <a:rPr lang="en-US" dirty="0"/>
+              <a:t>Extra credit:</a:t>
+            </a:r>
+          </a:p>
+          <a:p>
+            <a:pPr lvl="1"/>
+            <a:r>
+              <a:rPr lang="en-US" dirty="0"/>
+              <a:t>Go significantly beyond class</a:t>
+            </a:r>
+          </a:p>
+          <a:p>
+            <a:pPr lvl="1"/>
+            <a:r>
+              <a:rPr lang="en-US" dirty="0"/>
+              <a:t>Some advanced topic</a:t>
+            </a:r>
+          </a:p>
+          <a:p>
+            <a:pPr lvl="1"/>
+            <a:r>
+              <a:rPr lang="en-US" dirty="0"/>
+              <a:t>New research idea</a:t>
+            </a:r>
+          </a:p>
+          <a:p>
+            <a:pPr lvl="1"/>
+            <a:r>
+              <a:rPr lang="en-US" dirty="0"/>
+              <a:t>Implementation in hardware</a:t>
+            </a:r>
+          </a:p>
+          <a:p>
+            <a:pPr lvl="1"/>
+            <a:r>
+              <a:rPr lang="en-US" dirty="0"/>
               <a:t>Can replace up to 20% of your grade</a:t>
-            </a:r>
-          </a:p>
-          <a:p>
-            <a:r>
-              <a:rPr lang="en-US" dirty="0"/>
-              <a:t>Should be significant work beyond the class</a:t>
-            </a:r>
-          </a:p>
-          <a:p>
-            <a:pPr lvl="1"/>
-            <a:r>
-              <a:rPr lang="en-US" dirty="0"/>
-              <a:t>Some advanced topic</a:t>
-            </a:r>
-          </a:p>
-          <a:p>
-            <a:pPr lvl="1"/>
-            <a:r>
-              <a:rPr lang="en-US" dirty="0"/>
-              <a:t>New research idea</a:t>
-            </a:r>
-          </a:p>
-          <a:p>
-            <a:r>
-              <a:rPr lang="en-US" dirty="0"/>
-              <a:t>Should include some detailed simulation</a:t>
             </a:r>
           </a:p>
           <a:p>
@@ -10123,7 +10208,7 @@
         </p:blipFill>
         <p:spPr bwMode="auto">
           <a:xfrm>
-            <a:off x="7608436" y="1687552"/>
+            <a:off x="8220419" y="1771988"/>
             <a:ext cx="2438400" cy="1876425"/>
           </a:xfrm>
           <a:prstGeom prst="rect">

</xml_diff>

<commit_message>
Updated the intro material
</commit_message>
<xml_diff>
--- a/Lectures/CourseAdmin.pptx
+++ b/Lectures/CourseAdmin.pptx
@@ -5,7 +5,7 @@
     <p:sldMasterId id="2147483648" r:id="rId1"/>
   </p:sldMasterIdLst>
   <p:notesMasterIdLst>
-    <p:notesMasterId r:id="rId18"/>
+    <p:notesMasterId r:id="rId17"/>
   </p:notesMasterIdLst>
   <p:sldIdLst>
     <p:sldId id="258" r:id="rId2"/>
@@ -18,12 +18,11 @@
     <p:sldId id="413" r:id="rId9"/>
     <p:sldId id="400" r:id="rId10"/>
     <p:sldId id="411" r:id="rId11"/>
-    <p:sldId id="416" r:id="rId12"/>
-    <p:sldId id="409" r:id="rId13"/>
-    <p:sldId id="408" r:id="rId14"/>
-    <p:sldId id="410" r:id="rId15"/>
-    <p:sldId id="270" r:id="rId16"/>
-    <p:sldId id="412" r:id="rId17"/>
+    <p:sldId id="409" r:id="rId12"/>
+    <p:sldId id="408" r:id="rId13"/>
+    <p:sldId id="410" r:id="rId14"/>
+    <p:sldId id="270" r:id="rId15"/>
+    <p:sldId id="412" r:id="rId16"/>
   </p:sldIdLst>
   <p:sldSz cx="12192000" cy="6858000"/>
   <p:notesSz cx="7315200" cy="9601200"/>
@@ -223,7 +222,7 @@
           <a:p>
             <a:fld id="{B7D6DDD3-D7E9-488B-B626-1E8285E424D8}" type="datetimeFigureOut">
               <a:rPr lang="en-US" smtClean="0"/>
-              <a:t>11/7/2022</a:t>
+              <a:t>9/5/2023</a:t>
             </a:fld>
             <a:endParaRPr lang="en-US"/>
           </a:p>
@@ -4469,29 +4468,162 @@
       </p:grpSpPr>
       <p:sp>
         <p:nvSpPr>
-          <p:cNvPr id="8" name="Rectangle: Rounded Corners 7">
-            <a:extLst>
-              <a:ext uri="{FF2B5EF4-FFF2-40B4-BE49-F238E27FC236}">
-                <a16:creationId xmlns:a16="http://schemas.microsoft.com/office/drawing/2014/main" id="{EA831CFB-A1B8-7AE4-D3A6-A1F7EDD9489C}"/>
-              </a:ext>
-            </a:extLst>
-          </p:cNvPr>
+          <p:cNvPr id="2" name="Title 1"/>
+          <p:cNvSpPr>
+            <a:spLocks noGrp="1"/>
+          </p:cNvSpPr>
+          <p:nvPr>
+            <p:ph type="title"/>
+          </p:nvPr>
+        </p:nvSpPr>
+        <p:spPr/>
+        <p:txBody>
+          <a:bodyPr/>
+          <a:lstStyle/>
+          <a:p>
+            <a:r>
+              <a:rPr lang="en-US" dirty="0"/>
+              <a:t>What is Digital Communications?</a:t>
+            </a:r>
+          </a:p>
+        </p:txBody>
+      </p:sp>
+      <p:sp>
+        <p:nvSpPr>
+          <p:cNvPr id="3" name="Slide Number Placeholder 2"/>
+          <p:cNvSpPr>
+            <a:spLocks noGrp="1"/>
+          </p:cNvSpPr>
+          <p:nvPr>
+            <p:ph type="sldNum" sz="quarter" idx="12"/>
+          </p:nvPr>
+        </p:nvSpPr>
+        <p:spPr/>
+        <p:txBody>
+          <a:bodyPr/>
+          <a:lstStyle/>
+          <a:p>
+            <a:fld id="{529F9F8D-2534-4D48-85E3-73908409BCC5}" type="slidenum">
+              <a:rPr lang="en-US" smtClean="0"/>
+              <a:pPr/>
+              <a:t>11</a:t>
+            </a:fld>
+            <a:endParaRPr lang="en-US"/>
+          </a:p>
+        </p:txBody>
+      </p:sp>
+      <p:sp>
+        <p:nvSpPr>
+          <p:cNvPr id="4" name="Content Placeholder 3"/>
+          <p:cNvSpPr>
+            <a:spLocks noGrp="1"/>
+          </p:cNvSpPr>
+          <p:nvPr>
+            <p:ph sz="quarter" idx="1"/>
+          </p:nvPr>
+        </p:nvSpPr>
+        <p:spPr>
+          <a:xfrm>
+            <a:off x="1219200" y="1582100"/>
+            <a:ext cx="7772400" cy="838200"/>
+          </a:xfrm>
+        </p:spPr>
+        <p:txBody>
+          <a:bodyPr>
+            <a:normAutofit/>
+          </a:bodyPr>
+          <a:lstStyle/>
+          <a:p>
+            <a:pPr marL="0" indent="0">
+              <a:buNone/>
+            </a:pPr>
+            <a:r>
+              <a:rPr lang="en-US" sz="2800" dirty="0"/>
+              <a:t>Transmission of digital data through a channel</a:t>
+            </a:r>
+          </a:p>
+        </p:txBody>
+      </p:sp>
+      <p:pic>
+        <p:nvPicPr>
+          <p:cNvPr id="5" name="Picture 7" descr="MCj03984990000[1]"/>
+          <p:cNvPicPr>
+            <a:picLocks noChangeAspect="1" noChangeArrowheads="1"/>
+          </p:cNvPicPr>
+          <p:nvPr/>
+        </p:nvPicPr>
+        <p:blipFill>
+          <a:blip r:embed="rId2"/>
+          <a:srcRect/>
+          <a:stretch>
+            <a:fillRect/>
+          </a:stretch>
+        </p:blipFill>
+        <p:spPr bwMode="auto">
+          <a:xfrm>
+            <a:off x="3200400" y="3418220"/>
+            <a:ext cx="1066800" cy="977900"/>
+          </a:xfrm>
+          <a:prstGeom prst="rect">
+            <a:avLst/>
+          </a:prstGeom>
+          <a:noFill/>
+          <a:ln w="9525">
+            <a:noFill/>
+            <a:miter lim="800000"/>
+            <a:headEnd/>
+            <a:tailEnd/>
+          </a:ln>
+        </p:spPr>
+      </p:pic>
+      <p:pic>
+        <p:nvPicPr>
+          <p:cNvPr id="6" name="Picture 21" descr="MCj04247820000[1]"/>
+          <p:cNvPicPr>
+            <a:picLocks noChangeAspect="1" noChangeArrowheads="1"/>
+          </p:cNvPicPr>
+          <p:nvPr/>
+        </p:nvPicPr>
+        <p:blipFill>
+          <a:blip r:embed="rId3"/>
+          <a:srcRect/>
+          <a:stretch>
+            <a:fillRect/>
+          </a:stretch>
+        </p:blipFill>
+        <p:spPr bwMode="auto">
+          <a:xfrm>
+            <a:off x="8369808" y="3640642"/>
+            <a:ext cx="1024284" cy="1008062"/>
+          </a:xfrm>
+          <a:prstGeom prst="rect">
+            <a:avLst/>
+          </a:prstGeom>
+          <a:noFill/>
+          <a:ln w="9525">
+            <a:noFill/>
+            <a:miter lim="800000"/>
+            <a:headEnd/>
+            <a:tailEnd/>
+          </a:ln>
+        </p:spPr>
+      </p:pic>
+      <p:sp>
+        <p:nvSpPr>
+          <p:cNvPr id="11" name="Right Arrow 10"/>
           <p:cNvSpPr/>
           <p:nvPr/>
         </p:nvSpPr>
         <p:spPr>
           <a:xfrm>
-            <a:off x="1036322" y="1871330"/>
-            <a:ext cx="4287046" cy="609600"/>
-          </a:xfrm>
-          <a:prstGeom prst="roundRect">
+            <a:off x="2127504" y="3853878"/>
+            <a:ext cx="978408" cy="484632"/>
+          </a:xfrm>
+          <a:prstGeom prst="rightArrow">
             <a:avLst/>
           </a:prstGeom>
           <a:solidFill>
-            <a:schemeClr val="accent1">
-              <a:lumMod val="20000"/>
-              <a:lumOff val="80000"/>
-            </a:schemeClr>
+            <a:srgbClr val="66CCFF"/>
           </a:solidFill>
         </p:spPr>
         <p:style>
@@ -4519,231 +4651,9 @@
           </a:p>
         </p:txBody>
       </p:sp>
-      <p:sp>
-        <p:nvSpPr>
-          <p:cNvPr id="2" name="Title 1">
-            <a:extLst>
-              <a:ext uri="{FF2B5EF4-FFF2-40B4-BE49-F238E27FC236}">
-                <a16:creationId xmlns:a16="http://schemas.microsoft.com/office/drawing/2014/main" id="{4D961D2D-FDCA-55CF-2B7E-1D3AEA67533A}"/>
-              </a:ext>
-            </a:extLst>
-          </p:cNvPr>
-          <p:cNvSpPr>
-            <a:spLocks noGrp="1"/>
-          </p:cNvSpPr>
-          <p:nvPr>
-            <p:ph type="title"/>
-          </p:nvPr>
-        </p:nvSpPr>
-        <p:spPr/>
-        <p:txBody>
-          <a:bodyPr/>
-          <a:lstStyle/>
-          <a:p>
-            <a:r>
-              <a:rPr lang="en-US" dirty="0"/>
-              <a:t>SDR </a:t>
-            </a:r>
-            <a:r>
-              <a:rPr lang="en-US" dirty="0" err="1"/>
-              <a:t>Github</a:t>
-            </a:r>
-            <a:r>
-              <a:rPr lang="en-US" dirty="0"/>
-              <a:t> Site</a:t>
-            </a:r>
-          </a:p>
-        </p:txBody>
-      </p:sp>
-      <p:sp>
-        <p:nvSpPr>
-          <p:cNvPr id="3" name="Content Placeholder 2">
-            <a:extLst>
-              <a:ext uri="{FF2B5EF4-FFF2-40B4-BE49-F238E27FC236}">
-                <a16:creationId xmlns:a16="http://schemas.microsoft.com/office/drawing/2014/main" id="{ACEDE6C8-C752-8E46-DA1A-07765CDE33C1}"/>
-              </a:ext>
-            </a:extLst>
-          </p:cNvPr>
-          <p:cNvSpPr>
-            <a:spLocks noGrp="1"/>
-          </p:cNvSpPr>
-          <p:nvPr>
-            <p:ph idx="1"/>
-          </p:nvPr>
-        </p:nvSpPr>
-        <p:spPr>
-          <a:xfrm>
-            <a:off x="5613990" y="1539277"/>
-            <a:ext cx="5541689" cy="4329817"/>
-          </a:xfrm>
-        </p:spPr>
-        <p:txBody>
-          <a:bodyPr/>
-          <a:lstStyle/>
-          <a:p>
-            <a:r>
-              <a:rPr lang="en-US" dirty="0"/>
-              <a:t>SDR labs are on a second </a:t>
-            </a:r>
-            <a:r>
-              <a:rPr lang="en-US" dirty="0" err="1"/>
-              <a:t>github</a:t>
-            </a:r>
-            <a:r>
-              <a:rPr lang="en-US" dirty="0"/>
-              <a:t> site</a:t>
-            </a:r>
-          </a:p>
-          <a:p>
-            <a:r>
-              <a:rPr lang="en-US" dirty="0"/>
-              <a:t>Contains:</a:t>
-            </a:r>
-          </a:p>
-          <a:p>
-            <a:pPr lvl="1"/>
-            <a:r>
-              <a:rPr lang="en-US" dirty="0"/>
-              <a:t>Instructions for setting up the labs</a:t>
-            </a:r>
-          </a:p>
-          <a:p>
-            <a:pPr lvl="1"/>
-            <a:r>
-              <a:rPr lang="en-US" dirty="0"/>
-              <a:t>MATLAB code skeletons</a:t>
-            </a:r>
-          </a:p>
-          <a:p>
-            <a:pPr lvl="1"/>
-            <a:r>
-              <a:rPr lang="en-US" dirty="0"/>
-              <a:t>Some slides</a:t>
-            </a:r>
-          </a:p>
-          <a:p>
-            <a:r>
-              <a:rPr lang="en-US" dirty="0"/>
-              <a:t>Still in progress</a:t>
-            </a:r>
-          </a:p>
-          <a:p>
-            <a:pPr lvl="1"/>
-            <a:r>
-              <a:rPr lang="en-US" dirty="0"/>
-              <a:t>Will be completed over the course of the semester</a:t>
-            </a:r>
-          </a:p>
-          <a:p>
-            <a:endParaRPr lang="en-US" dirty="0"/>
-          </a:p>
-        </p:txBody>
-      </p:sp>
-      <p:sp>
-        <p:nvSpPr>
-          <p:cNvPr id="4" name="Slide Number Placeholder 3">
-            <a:extLst>
-              <a:ext uri="{FF2B5EF4-FFF2-40B4-BE49-F238E27FC236}">
-                <a16:creationId xmlns:a16="http://schemas.microsoft.com/office/drawing/2014/main" id="{F32BC416-A60A-7715-9EAA-2B7476B0BE21}"/>
-              </a:ext>
-            </a:extLst>
-          </p:cNvPr>
-          <p:cNvSpPr>
-            <a:spLocks noGrp="1"/>
-          </p:cNvSpPr>
-          <p:nvPr>
-            <p:ph type="sldNum" sz="quarter" idx="12"/>
-          </p:nvPr>
-        </p:nvSpPr>
-        <p:spPr/>
-        <p:txBody>
-          <a:bodyPr/>
-          <a:lstStyle/>
-          <a:p>
-            <a:fld id="{629637A9-119A-49DA-BD12-AAC58B377D80}" type="slidenum">
-              <a:rPr lang="en-US" smtClean="0"/>
-              <a:t>11</a:t>
-            </a:fld>
-            <a:endParaRPr lang="en-US" dirty="0"/>
-          </a:p>
-        </p:txBody>
-      </p:sp>
-      <p:sp>
-        <p:nvSpPr>
-          <p:cNvPr id="7" name="TextBox 6">
-            <a:extLst>
-              <a:ext uri="{FF2B5EF4-FFF2-40B4-BE49-F238E27FC236}">
-                <a16:creationId xmlns:a16="http://schemas.microsoft.com/office/drawing/2014/main" id="{53662F7C-17DB-C489-20D7-95E9A3C6364D}"/>
-              </a:ext>
-            </a:extLst>
-          </p:cNvPr>
-          <p:cNvSpPr txBox="1"/>
-          <p:nvPr/>
-        </p:nvSpPr>
-        <p:spPr>
-          <a:xfrm>
-            <a:off x="1097280" y="1994762"/>
-            <a:ext cx="3571940" cy="369332"/>
-          </a:xfrm>
-          <a:prstGeom prst="rect">
-            <a:avLst/>
-          </a:prstGeom>
-          <a:noFill/>
-        </p:spPr>
-        <p:txBody>
-          <a:bodyPr wrap="none" rtlCol="0">
-            <a:spAutoFit/>
-          </a:bodyPr>
-          <a:lstStyle/>
-          <a:p>
-            <a:r>
-              <a:rPr lang="en-US" dirty="0">
-                <a:hlinkClick r:id="rId2"/>
-              </a:rPr>
-              <a:t>https://github.com/sdrangan/sdrlab</a:t>
-            </a:r>
-            <a:endParaRPr lang="en-US" dirty="0"/>
-          </a:p>
-        </p:txBody>
-      </p:sp>
       <p:pic>
         <p:nvPicPr>
-          <p:cNvPr id="5" name="Picture 4">
-            <a:extLst>
-              <a:ext uri="{FF2B5EF4-FFF2-40B4-BE49-F238E27FC236}">
-                <a16:creationId xmlns:a16="http://schemas.microsoft.com/office/drawing/2014/main" id="{A4101C1F-C695-5EAC-26BA-C5EC94534A6B}"/>
-              </a:ext>
-            </a:extLst>
-          </p:cNvPr>
-          <p:cNvPicPr>
-            <a:picLocks noChangeAspect="1"/>
-          </p:cNvPicPr>
-          <p:nvPr/>
-        </p:nvPicPr>
-        <p:blipFill rotWithShape="1">
-          <a:blip r:embed="rId3"/>
-          <a:srcRect r="53953"/>
-          <a:stretch/>
-        </p:blipFill>
-        <p:spPr>
-          <a:xfrm>
-            <a:off x="1067661" y="2846176"/>
-            <a:ext cx="4401018" cy="2854656"/>
-          </a:xfrm>
-          <a:prstGeom prst="rect">
-            <a:avLst/>
-          </a:prstGeom>
-        </p:spPr>
-      </p:pic>
-      <p:pic>
-        <p:nvPicPr>
-          <p:cNvPr id="9" name="Picture 8">
-            <a:extLst>
-              <a:ext uri="{FF2B5EF4-FFF2-40B4-BE49-F238E27FC236}">
-                <a16:creationId xmlns:a16="http://schemas.microsoft.com/office/drawing/2014/main" id="{22F5FA87-C42B-8FC2-5231-144A4D89053C}"/>
-              </a:ext>
-            </a:extLst>
-          </p:cNvPr>
+          <p:cNvPr id="13" name="Picture 12" descr="761px-Rayleigh_fading_doppler_10Hz.svg.png"/>
           <p:cNvPicPr>
             <a:picLocks noChangeAspect="1"/>
           </p:cNvPicPr>
@@ -4757,20 +4667,342 @@
         </p:blipFill>
         <p:spPr>
           <a:xfrm>
-            <a:off x="5759301" y="4160622"/>
-            <a:ext cx="2847316" cy="2153646"/>
+            <a:off x="5105400" y="3418221"/>
+            <a:ext cx="2286000" cy="1355947"/>
           </a:xfrm>
           <a:prstGeom prst="rect">
             <a:avLst/>
           </a:prstGeom>
         </p:spPr>
       </p:pic>
+      <p:sp>
+        <p:nvSpPr>
+          <p:cNvPr id="14" name="TextBox 13"/>
+          <p:cNvSpPr txBox="1"/>
+          <p:nvPr/>
+        </p:nvSpPr>
+        <p:spPr>
+          <a:xfrm>
+            <a:off x="1706080" y="2932756"/>
+            <a:ext cx="1529586" cy="707886"/>
+          </a:xfrm>
+          <a:prstGeom prst="rect">
+            <a:avLst/>
+          </a:prstGeom>
+          <a:noFill/>
+        </p:spPr>
+        <p:txBody>
+          <a:bodyPr wrap="none" rtlCol="0">
+            <a:spAutoFit/>
+          </a:bodyPr>
+          <a:lstStyle/>
+          <a:p>
+            <a:r>
+              <a:rPr lang="en-US" sz="2000" dirty="0"/>
+              <a:t>Digital data</a:t>
+            </a:r>
+          </a:p>
+          <a:p>
+            <a:r>
+              <a:rPr lang="en-US" sz="2000" dirty="0"/>
+              <a:t>011000101…</a:t>
+            </a:r>
+          </a:p>
+        </p:txBody>
+      </p:sp>
+      <p:sp>
+        <p:nvSpPr>
+          <p:cNvPr id="15" name="TextBox 14"/>
+          <p:cNvSpPr txBox="1"/>
+          <p:nvPr/>
+        </p:nvSpPr>
+        <p:spPr>
+          <a:xfrm>
+            <a:off x="5334001" y="2818056"/>
+            <a:ext cx="2514600" cy="461665"/>
+          </a:xfrm>
+          <a:prstGeom prst="rect">
+            <a:avLst/>
+          </a:prstGeom>
+          <a:noFill/>
+        </p:spPr>
+        <p:txBody>
+          <a:bodyPr wrap="square" rtlCol="0">
+            <a:spAutoFit/>
+          </a:bodyPr>
+          <a:lstStyle/>
+          <a:p>
+            <a:r>
+              <a:rPr lang="en-US" sz="2400" dirty="0"/>
+              <a:t>Analog waveform</a:t>
+            </a:r>
+          </a:p>
+        </p:txBody>
+      </p:sp>
+      <p:sp>
+        <p:nvSpPr>
+          <p:cNvPr id="16" name="TextBox 15"/>
+          <p:cNvSpPr txBox="1"/>
+          <p:nvPr/>
+        </p:nvSpPr>
+        <p:spPr>
+          <a:xfrm>
+            <a:off x="2644291" y="5171924"/>
+            <a:ext cx="1859740" cy="523220"/>
+          </a:xfrm>
+          <a:prstGeom prst="rect">
+            <a:avLst/>
+          </a:prstGeom>
+          <a:noFill/>
+        </p:spPr>
+        <p:txBody>
+          <a:bodyPr wrap="none" rtlCol="0">
+            <a:spAutoFit/>
+          </a:bodyPr>
+          <a:lstStyle/>
+          <a:p>
+            <a:r>
+              <a:rPr lang="en-US" sz="2800" dirty="0">
+                <a:solidFill>
+                  <a:srgbClr val="0F6FC6"/>
+                </a:solidFill>
+              </a:rPr>
+              <a:t>Transmitter</a:t>
+            </a:r>
+          </a:p>
+        </p:txBody>
+      </p:sp>
+      <p:sp>
+        <p:nvSpPr>
+          <p:cNvPr id="17" name="Right Arrow 16"/>
+          <p:cNvSpPr/>
+          <p:nvPr/>
+        </p:nvSpPr>
+        <p:spPr>
+          <a:xfrm>
+            <a:off x="4355593" y="3763962"/>
+            <a:ext cx="978408" cy="484632"/>
+          </a:xfrm>
+          <a:prstGeom prst="rightArrow">
+            <a:avLst/>
+          </a:prstGeom>
+          <a:solidFill>
+            <a:srgbClr val="FFCC00"/>
+          </a:solidFill>
+        </p:spPr>
+        <p:style>
+          <a:lnRef idx="2">
+            <a:schemeClr val="accent1">
+              <a:shade val="50000"/>
+            </a:schemeClr>
+          </a:lnRef>
+          <a:fillRef idx="1">
+            <a:schemeClr val="accent1"/>
+          </a:fillRef>
+          <a:effectRef idx="0">
+            <a:schemeClr val="accent1"/>
+          </a:effectRef>
+          <a:fontRef idx="minor">
+            <a:schemeClr val="lt1"/>
+          </a:fontRef>
+        </p:style>
+        <p:txBody>
+          <a:bodyPr rtlCol="0" anchor="ctr"/>
+          <a:lstStyle/>
+          <a:p>
+            <a:pPr algn="ctr"/>
+            <a:endParaRPr lang="en-US"/>
+          </a:p>
+        </p:txBody>
+      </p:sp>
+      <p:sp>
+        <p:nvSpPr>
+          <p:cNvPr id="18" name="Right Arrow 17"/>
+          <p:cNvSpPr/>
+          <p:nvPr/>
+        </p:nvSpPr>
+        <p:spPr>
+          <a:xfrm>
+            <a:off x="7479792" y="3733800"/>
+            <a:ext cx="978408" cy="484632"/>
+          </a:xfrm>
+          <a:prstGeom prst="rightArrow">
+            <a:avLst/>
+          </a:prstGeom>
+          <a:solidFill>
+            <a:srgbClr val="FFCC00"/>
+          </a:solidFill>
+        </p:spPr>
+        <p:style>
+          <a:lnRef idx="2">
+            <a:schemeClr val="accent1">
+              <a:shade val="50000"/>
+            </a:schemeClr>
+          </a:lnRef>
+          <a:fillRef idx="1">
+            <a:schemeClr val="accent1"/>
+          </a:fillRef>
+          <a:effectRef idx="0">
+            <a:schemeClr val="accent1"/>
+          </a:effectRef>
+          <a:fontRef idx="minor">
+            <a:schemeClr val="lt1"/>
+          </a:fontRef>
+        </p:style>
+        <p:txBody>
+          <a:bodyPr rtlCol="0" anchor="ctr"/>
+          <a:lstStyle/>
+          <a:p>
+            <a:pPr algn="ctr"/>
+            <a:endParaRPr lang="en-US"/>
+          </a:p>
+        </p:txBody>
+      </p:sp>
+      <p:sp>
+        <p:nvSpPr>
+          <p:cNvPr id="19" name="Right Arrow 18"/>
+          <p:cNvSpPr/>
+          <p:nvPr/>
+        </p:nvSpPr>
+        <p:spPr>
+          <a:xfrm>
+            <a:off x="9394092" y="3763962"/>
+            <a:ext cx="978408" cy="484632"/>
+          </a:xfrm>
+          <a:prstGeom prst="rightArrow">
+            <a:avLst/>
+          </a:prstGeom>
+          <a:solidFill>
+            <a:srgbClr val="66CCFF"/>
+          </a:solidFill>
+        </p:spPr>
+        <p:style>
+          <a:lnRef idx="2">
+            <a:schemeClr val="accent1">
+              <a:shade val="50000"/>
+            </a:schemeClr>
+          </a:lnRef>
+          <a:fillRef idx="1">
+            <a:schemeClr val="accent1"/>
+          </a:fillRef>
+          <a:effectRef idx="0">
+            <a:schemeClr val="accent1"/>
+          </a:effectRef>
+          <a:fontRef idx="minor">
+            <a:schemeClr val="lt1"/>
+          </a:fontRef>
+        </p:style>
+        <p:txBody>
+          <a:bodyPr rtlCol="0" anchor="ctr"/>
+          <a:lstStyle/>
+          <a:p>
+            <a:pPr algn="ctr"/>
+            <a:endParaRPr lang="en-US"/>
+          </a:p>
+        </p:txBody>
+      </p:sp>
+      <p:sp>
+        <p:nvSpPr>
+          <p:cNvPr id="20" name="TextBox 19"/>
+          <p:cNvSpPr txBox="1"/>
+          <p:nvPr/>
+        </p:nvSpPr>
+        <p:spPr>
+          <a:xfrm>
+            <a:off x="9173680" y="2949714"/>
+            <a:ext cx="1529586" cy="707886"/>
+          </a:xfrm>
+          <a:prstGeom prst="rect">
+            <a:avLst/>
+          </a:prstGeom>
+          <a:noFill/>
+        </p:spPr>
+        <p:txBody>
+          <a:bodyPr wrap="none" rtlCol="0">
+            <a:spAutoFit/>
+          </a:bodyPr>
+          <a:lstStyle/>
+          <a:p>
+            <a:r>
+              <a:rPr lang="en-US" sz="2000" dirty="0"/>
+              <a:t>Digital data</a:t>
+            </a:r>
+          </a:p>
+          <a:p>
+            <a:r>
+              <a:rPr lang="en-US" sz="2000" dirty="0"/>
+              <a:t>011000101…</a:t>
+            </a:r>
+          </a:p>
+        </p:txBody>
+      </p:sp>
+      <p:sp>
+        <p:nvSpPr>
+          <p:cNvPr id="23" name="TextBox 22"/>
+          <p:cNvSpPr txBox="1"/>
+          <p:nvPr/>
+        </p:nvSpPr>
+        <p:spPr>
+          <a:xfrm>
+            <a:off x="5680098" y="5171924"/>
+            <a:ext cx="1374094" cy="523220"/>
+          </a:xfrm>
+          <a:prstGeom prst="rect">
+            <a:avLst/>
+          </a:prstGeom>
+          <a:noFill/>
+        </p:spPr>
+        <p:txBody>
+          <a:bodyPr wrap="none" rtlCol="0">
+            <a:spAutoFit/>
+          </a:bodyPr>
+          <a:lstStyle/>
+          <a:p>
+            <a:r>
+              <a:rPr lang="en-US" sz="2800" dirty="0">
+                <a:solidFill>
+                  <a:srgbClr val="0F6FC6"/>
+                </a:solidFill>
+              </a:rPr>
+              <a:t>Channel</a:t>
+            </a:r>
+          </a:p>
+        </p:txBody>
+      </p:sp>
+      <p:sp>
+        <p:nvSpPr>
+          <p:cNvPr id="24" name="TextBox 23"/>
+          <p:cNvSpPr txBox="1"/>
+          <p:nvPr/>
+        </p:nvSpPr>
+        <p:spPr>
+          <a:xfrm>
+            <a:off x="8128374" y="5191780"/>
+            <a:ext cx="1425198" cy="523220"/>
+          </a:xfrm>
+          <a:prstGeom prst="rect">
+            <a:avLst/>
+          </a:prstGeom>
+          <a:noFill/>
+        </p:spPr>
+        <p:txBody>
+          <a:bodyPr wrap="none" rtlCol="0">
+            <a:spAutoFit/>
+          </a:bodyPr>
+          <a:lstStyle/>
+          <a:p>
+            <a:r>
+              <a:rPr lang="en-US" sz="2800" dirty="0">
+                <a:solidFill>
+                  <a:srgbClr val="0F6FC6"/>
+                </a:solidFill>
+              </a:rPr>
+              <a:t>Receiver</a:t>
+            </a:r>
+          </a:p>
+        </p:txBody>
+      </p:sp>
     </p:spTree>
-    <p:extLst>
-      <p:ext uri="{BB962C8B-B14F-4D97-AF65-F5344CB8AC3E}">
-        <p14:creationId xmlns:p14="http://schemas.microsoft.com/office/powerpoint/2010/main" val="2868118489"/>
-      </p:ext>
-    </p:extLst>
   </p:cSld>
   <p:clrMapOvr>
     <a:masterClrMapping/>
@@ -4807,12 +5039,14 @@
         </p:nvSpPr>
         <p:spPr/>
         <p:txBody>
-          <a:bodyPr/>
-          <a:lstStyle/>
-          <a:p>
-            <a:r>
-              <a:rPr lang="en-US" dirty="0"/>
-              <a:t>What is Digital Communications?</a:t>
+          <a:bodyPr>
+            <a:normAutofit/>
+          </a:bodyPr>
+          <a:lstStyle/>
+          <a:p>
+            <a:r>
+              <a:rPr lang="en-US" dirty="0"/>
+              <a:t>Digital Communications is Everywhere!</a:t>
             </a:r>
           </a:p>
         </p:txBody>
@@ -4836,569 +5070,6 @@
               <a:rPr lang="en-US" smtClean="0"/>
               <a:pPr/>
               <a:t>12</a:t>
-            </a:fld>
-            <a:endParaRPr lang="en-US"/>
-          </a:p>
-        </p:txBody>
-      </p:sp>
-      <p:sp>
-        <p:nvSpPr>
-          <p:cNvPr id="4" name="Content Placeholder 3"/>
-          <p:cNvSpPr>
-            <a:spLocks noGrp="1"/>
-          </p:cNvSpPr>
-          <p:nvPr>
-            <p:ph sz="quarter" idx="1"/>
-          </p:nvPr>
-        </p:nvSpPr>
-        <p:spPr>
-          <a:xfrm>
-            <a:off x="1219200" y="1582100"/>
-            <a:ext cx="7772400" cy="838200"/>
-          </a:xfrm>
-        </p:spPr>
-        <p:txBody>
-          <a:bodyPr>
-            <a:normAutofit/>
-          </a:bodyPr>
-          <a:lstStyle/>
-          <a:p>
-            <a:pPr marL="0" indent="0">
-              <a:buNone/>
-            </a:pPr>
-            <a:r>
-              <a:rPr lang="en-US" sz="2800" dirty="0"/>
-              <a:t>Transmission of digital data through a channel</a:t>
-            </a:r>
-          </a:p>
-        </p:txBody>
-      </p:sp>
-      <p:pic>
-        <p:nvPicPr>
-          <p:cNvPr id="5" name="Picture 7" descr="MCj03984990000[1]"/>
-          <p:cNvPicPr>
-            <a:picLocks noChangeAspect="1" noChangeArrowheads="1"/>
-          </p:cNvPicPr>
-          <p:nvPr/>
-        </p:nvPicPr>
-        <p:blipFill>
-          <a:blip r:embed="rId2"/>
-          <a:srcRect/>
-          <a:stretch>
-            <a:fillRect/>
-          </a:stretch>
-        </p:blipFill>
-        <p:spPr bwMode="auto">
-          <a:xfrm>
-            <a:off x="3200400" y="3418220"/>
-            <a:ext cx="1066800" cy="977900"/>
-          </a:xfrm>
-          <a:prstGeom prst="rect">
-            <a:avLst/>
-          </a:prstGeom>
-          <a:noFill/>
-          <a:ln w="9525">
-            <a:noFill/>
-            <a:miter lim="800000"/>
-            <a:headEnd/>
-            <a:tailEnd/>
-          </a:ln>
-        </p:spPr>
-      </p:pic>
-      <p:pic>
-        <p:nvPicPr>
-          <p:cNvPr id="6" name="Picture 21" descr="MCj04247820000[1]"/>
-          <p:cNvPicPr>
-            <a:picLocks noChangeAspect="1" noChangeArrowheads="1"/>
-          </p:cNvPicPr>
-          <p:nvPr/>
-        </p:nvPicPr>
-        <p:blipFill>
-          <a:blip r:embed="rId3"/>
-          <a:srcRect/>
-          <a:stretch>
-            <a:fillRect/>
-          </a:stretch>
-        </p:blipFill>
-        <p:spPr bwMode="auto">
-          <a:xfrm>
-            <a:off x="8369808" y="3640642"/>
-            <a:ext cx="1024284" cy="1008062"/>
-          </a:xfrm>
-          <a:prstGeom prst="rect">
-            <a:avLst/>
-          </a:prstGeom>
-          <a:noFill/>
-          <a:ln w="9525">
-            <a:noFill/>
-            <a:miter lim="800000"/>
-            <a:headEnd/>
-            <a:tailEnd/>
-          </a:ln>
-        </p:spPr>
-      </p:pic>
-      <p:sp>
-        <p:nvSpPr>
-          <p:cNvPr id="11" name="Right Arrow 10"/>
-          <p:cNvSpPr/>
-          <p:nvPr/>
-        </p:nvSpPr>
-        <p:spPr>
-          <a:xfrm>
-            <a:off x="2127504" y="3853878"/>
-            <a:ext cx="978408" cy="484632"/>
-          </a:xfrm>
-          <a:prstGeom prst="rightArrow">
-            <a:avLst/>
-          </a:prstGeom>
-          <a:solidFill>
-            <a:srgbClr val="66CCFF"/>
-          </a:solidFill>
-        </p:spPr>
-        <p:style>
-          <a:lnRef idx="2">
-            <a:schemeClr val="accent1">
-              <a:shade val="50000"/>
-            </a:schemeClr>
-          </a:lnRef>
-          <a:fillRef idx="1">
-            <a:schemeClr val="accent1"/>
-          </a:fillRef>
-          <a:effectRef idx="0">
-            <a:schemeClr val="accent1"/>
-          </a:effectRef>
-          <a:fontRef idx="minor">
-            <a:schemeClr val="lt1"/>
-          </a:fontRef>
-        </p:style>
-        <p:txBody>
-          <a:bodyPr rtlCol="0" anchor="ctr"/>
-          <a:lstStyle/>
-          <a:p>
-            <a:pPr algn="ctr"/>
-            <a:endParaRPr lang="en-US"/>
-          </a:p>
-        </p:txBody>
-      </p:sp>
-      <p:pic>
-        <p:nvPicPr>
-          <p:cNvPr id="13" name="Picture 12" descr="761px-Rayleigh_fading_doppler_10Hz.svg.png"/>
-          <p:cNvPicPr>
-            <a:picLocks noChangeAspect="1"/>
-          </p:cNvPicPr>
-          <p:nvPr/>
-        </p:nvPicPr>
-        <p:blipFill>
-          <a:blip r:embed="rId4"/>
-          <a:stretch>
-            <a:fillRect/>
-          </a:stretch>
-        </p:blipFill>
-        <p:spPr>
-          <a:xfrm>
-            <a:off x="5105400" y="3418221"/>
-            <a:ext cx="2286000" cy="1355947"/>
-          </a:xfrm>
-          <a:prstGeom prst="rect">
-            <a:avLst/>
-          </a:prstGeom>
-        </p:spPr>
-      </p:pic>
-      <p:sp>
-        <p:nvSpPr>
-          <p:cNvPr id="14" name="TextBox 13"/>
-          <p:cNvSpPr txBox="1"/>
-          <p:nvPr/>
-        </p:nvSpPr>
-        <p:spPr>
-          <a:xfrm>
-            <a:off x="1706080" y="2932756"/>
-            <a:ext cx="1529586" cy="707886"/>
-          </a:xfrm>
-          <a:prstGeom prst="rect">
-            <a:avLst/>
-          </a:prstGeom>
-          <a:noFill/>
-        </p:spPr>
-        <p:txBody>
-          <a:bodyPr wrap="none" rtlCol="0">
-            <a:spAutoFit/>
-          </a:bodyPr>
-          <a:lstStyle/>
-          <a:p>
-            <a:r>
-              <a:rPr lang="en-US" sz="2000" dirty="0"/>
-              <a:t>Digital data</a:t>
-            </a:r>
-          </a:p>
-          <a:p>
-            <a:r>
-              <a:rPr lang="en-US" sz="2000" dirty="0"/>
-              <a:t>011000101…</a:t>
-            </a:r>
-          </a:p>
-        </p:txBody>
-      </p:sp>
-      <p:sp>
-        <p:nvSpPr>
-          <p:cNvPr id="15" name="TextBox 14"/>
-          <p:cNvSpPr txBox="1"/>
-          <p:nvPr/>
-        </p:nvSpPr>
-        <p:spPr>
-          <a:xfrm>
-            <a:off x="5334001" y="2818056"/>
-            <a:ext cx="2514600" cy="461665"/>
-          </a:xfrm>
-          <a:prstGeom prst="rect">
-            <a:avLst/>
-          </a:prstGeom>
-          <a:noFill/>
-        </p:spPr>
-        <p:txBody>
-          <a:bodyPr wrap="square" rtlCol="0">
-            <a:spAutoFit/>
-          </a:bodyPr>
-          <a:lstStyle/>
-          <a:p>
-            <a:r>
-              <a:rPr lang="en-US" sz="2400" dirty="0"/>
-              <a:t>Analog waveform</a:t>
-            </a:r>
-          </a:p>
-        </p:txBody>
-      </p:sp>
-      <p:sp>
-        <p:nvSpPr>
-          <p:cNvPr id="16" name="TextBox 15"/>
-          <p:cNvSpPr txBox="1"/>
-          <p:nvPr/>
-        </p:nvSpPr>
-        <p:spPr>
-          <a:xfrm>
-            <a:off x="2644291" y="5171924"/>
-            <a:ext cx="1859740" cy="523220"/>
-          </a:xfrm>
-          <a:prstGeom prst="rect">
-            <a:avLst/>
-          </a:prstGeom>
-          <a:noFill/>
-        </p:spPr>
-        <p:txBody>
-          <a:bodyPr wrap="none" rtlCol="0">
-            <a:spAutoFit/>
-          </a:bodyPr>
-          <a:lstStyle/>
-          <a:p>
-            <a:r>
-              <a:rPr lang="en-US" sz="2800" dirty="0">
-                <a:solidFill>
-                  <a:srgbClr val="0F6FC6"/>
-                </a:solidFill>
-              </a:rPr>
-              <a:t>Transmitter</a:t>
-            </a:r>
-          </a:p>
-        </p:txBody>
-      </p:sp>
-      <p:sp>
-        <p:nvSpPr>
-          <p:cNvPr id="17" name="Right Arrow 16"/>
-          <p:cNvSpPr/>
-          <p:nvPr/>
-        </p:nvSpPr>
-        <p:spPr>
-          <a:xfrm>
-            <a:off x="4355593" y="3763962"/>
-            <a:ext cx="978408" cy="484632"/>
-          </a:xfrm>
-          <a:prstGeom prst="rightArrow">
-            <a:avLst/>
-          </a:prstGeom>
-          <a:solidFill>
-            <a:srgbClr val="FFCC00"/>
-          </a:solidFill>
-        </p:spPr>
-        <p:style>
-          <a:lnRef idx="2">
-            <a:schemeClr val="accent1">
-              <a:shade val="50000"/>
-            </a:schemeClr>
-          </a:lnRef>
-          <a:fillRef idx="1">
-            <a:schemeClr val="accent1"/>
-          </a:fillRef>
-          <a:effectRef idx="0">
-            <a:schemeClr val="accent1"/>
-          </a:effectRef>
-          <a:fontRef idx="minor">
-            <a:schemeClr val="lt1"/>
-          </a:fontRef>
-        </p:style>
-        <p:txBody>
-          <a:bodyPr rtlCol="0" anchor="ctr"/>
-          <a:lstStyle/>
-          <a:p>
-            <a:pPr algn="ctr"/>
-            <a:endParaRPr lang="en-US"/>
-          </a:p>
-        </p:txBody>
-      </p:sp>
-      <p:sp>
-        <p:nvSpPr>
-          <p:cNvPr id="18" name="Right Arrow 17"/>
-          <p:cNvSpPr/>
-          <p:nvPr/>
-        </p:nvSpPr>
-        <p:spPr>
-          <a:xfrm>
-            <a:off x="7479792" y="3733800"/>
-            <a:ext cx="978408" cy="484632"/>
-          </a:xfrm>
-          <a:prstGeom prst="rightArrow">
-            <a:avLst/>
-          </a:prstGeom>
-          <a:solidFill>
-            <a:srgbClr val="FFCC00"/>
-          </a:solidFill>
-        </p:spPr>
-        <p:style>
-          <a:lnRef idx="2">
-            <a:schemeClr val="accent1">
-              <a:shade val="50000"/>
-            </a:schemeClr>
-          </a:lnRef>
-          <a:fillRef idx="1">
-            <a:schemeClr val="accent1"/>
-          </a:fillRef>
-          <a:effectRef idx="0">
-            <a:schemeClr val="accent1"/>
-          </a:effectRef>
-          <a:fontRef idx="minor">
-            <a:schemeClr val="lt1"/>
-          </a:fontRef>
-        </p:style>
-        <p:txBody>
-          <a:bodyPr rtlCol="0" anchor="ctr"/>
-          <a:lstStyle/>
-          <a:p>
-            <a:pPr algn="ctr"/>
-            <a:endParaRPr lang="en-US"/>
-          </a:p>
-        </p:txBody>
-      </p:sp>
-      <p:sp>
-        <p:nvSpPr>
-          <p:cNvPr id="19" name="Right Arrow 18"/>
-          <p:cNvSpPr/>
-          <p:nvPr/>
-        </p:nvSpPr>
-        <p:spPr>
-          <a:xfrm>
-            <a:off x="9394092" y="3763962"/>
-            <a:ext cx="978408" cy="484632"/>
-          </a:xfrm>
-          <a:prstGeom prst="rightArrow">
-            <a:avLst/>
-          </a:prstGeom>
-          <a:solidFill>
-            <a:srgbClr val="66CCFF"/>
-          </a:solidFill>
-        </p:spPr>
-        <p:style>
-          <a:lnRef idx="2">
-            <a:schemeClr val="accent1">
-              <a:shade val="50000"/>
-            </a:schemeClr>
-          </a:lnRef>
-          <a:fillRef idx="1">
-            <a:schemeClr val="accent1"/>
-          </a:fillRef>
-          <a:effectRef idx="0">
-            <a:schemeClr val="accent1"/>
-          </a:effectRef>
-          <a:fontRef idx="minor">
-            <a:schemeClr val="lt1"/>
-          </a:fontRef>
-        </p:style>
-        <p:txBody>
-          <a:bodyPr rtlCol="0" anchor="ctr"/>
-          <a:lstStyle/>
-          <a:p>
-            <a:pPr algn="ctr"/>
-            <a:endParaRPr lang="en-US"/>
-          </a:p>
-        </p:txBody>
-      </p:sp>
-      <p:sp>
-        <p:nvSpPr>
-          <p:cNvPr id="20" name="TextBox 19"/>
-          <p:cNvSpPr txBox="1"/>
-          <p:nvPr/>
-        </p:nvSpPr>
-        <p:spPr>
-          <a:xfrm>
-            <a:off x="9173680" y="2949714"/>
-            <a:ext cx="1529586" cy="707886"/>
-          </a:xfrm>
-          <a:prstGeom prst="rect">
-            <a:avLst/>
-          </a:prstGeom>
-          <a:noFill/>
-        </p:spPr>
-        <p:txBody>
-          <a:bodyPr wrap="none" rtlCol="0">
-            <a:spAutoFit/>
-          </a:bodyPr>
-          <a:lstStyle/>
-          <a:p>
-            <a:r>
-              <a:rPr lang="en-US" sz="2000" dirty="0"/>
-              <a:t>Digital data</a:t>
-            </a:r>
-          </a:p>
-          <a:p>
-            <a:r>
-              <a:rPr lang="en-US" sz="2000" dirty="0"/>
-              <a:t>011000101…</a:t>
-            </a:r>
-          </a:p>
-        </p:txBody>
-      </p:sp>
-      <p:sp>
-        <p:nvSpPr>
-          <p:cNvPr id="23" name="TextBox 22"/>
-          <p:cNvSpPr txBox="1"/>
-          <p:nvPr/>
-        </p:nvSpPr>
-        <p:spPr>
-          <a:xfrm>
-            <a:off x="5680098" y="5171924"/>
-            <a:ext cx="1374094" cy="523220"/>
-          </a:xfrm>
-          <a:prstGeom prst="rect">
-            <a:avLst/>
-          </a:prstGeom>
-          <a:noFill/>
-        </p:spPr>
-        <p:txBody>
-          <a:bodyPr wrap="none" rtlCol="0">
-            <a:spAutoFit/>
-          </a:bodyPr>
-          <a:lstStyle/>
-          <a:p>
-            <a:r>
-              <a:rPr lang="en-US" sz="2800" dirty="0">
-                <a:solidFill>
-                  <a:srgbClr val="0F6FC6"/>
-                </a:solidFill>
-              </a:rPr>
-              <a:t>Channel</a:t>
-            </a:r>
-          </a:p>
-        </p:txBody>
-      </p:sp>
-      <p:sp>
-        <p:nvSpPr>
-          <p:cNvPr id="24" name="TextBox 23"/>
-          <p:cNvSpPr txBox="1"/>
-          <p:nvPr/>
-        </p:nvSpPr>
-        <p:spPr>
-          <a:xfrm>
-            <a:off x="8128374" y="5191780"/>
-            <a:ext cx="1425198" cy="523220"/>
-          </a:xfrm>
-          <a:prstGeom prst="rect">
-            <a:avLst/>
-          </a:prstGeom>
-          <a:noFill/>
-        </p:spPr>
-        <p:txBody>
-          <a:bodyPr wrap="none" rtlCol="0">
-            <a:spAutoFit/>
-          </a:bodyPr>
-          <a:lstStyle/>
-          <a:p>
-            <a:r>
-              <a:rPr lang="en-US" sz="2800" dirty="0">
-                <a:solidFill>
-                  <a:srgbClr val="0F6FC6"/>
-                </a:solidFill>
-              </a:rPr>
-              <a:t>Receiver</a:t>
-            </a:r>
-          </a:p>
-        </p:txBody>
-      </p:sp>
-    </p:spTree>
-  </p:cSld>
-  <p:clrMapOvr>
-    <a:masterClrMapping/>
-  </p:clrMapOvr>
-</p:sld>
-</file>
-
-<file path=ppt/slides/slide13.xml><?xml version="1.0" encoding="utf-8"?>
-<p:sld xmlns:a="http://schemas.openxmlformats.org/drawingml/2006/main" xmlns:r="http://schemas.openxmlformats.org/officeDocument/2006/relationships" xmlns:p="http://schemas.openxmlformats.org/presentationml/2006/main">
-  <p:cSld>
-    <p:spTree>
-      <p:nvGrpSpPr>
-        <p:cNvPr id="1" name=""/>
-        <p:cNvGrpSpPr/>
-        <p:nvPr/>
-      </p:nvGrpSpPr>
-      <p:grpSpPr>
-        <a:xfrm>
-          <a:off x="0" y="0"/>
-          <a:ext cx="0" cy="0"/>
-          <a:chOff x="0" y="0"/>
-          <a:chExt cx="0" cy="0"/>
-        </a:xfrm>
-      </p:grpSpPr>
-      <p:sp>
-        <p:nvSpPr>
-          <p:cNvPr id="2" name="Title 1"/>
-          <p:cNvSpPr>
-            <a:spLocks noGrp="1"/>
-          </p:cNvSpPr>
-          <p:nvPr>
-            <p:ph type="title"/>
-          </p:nvPr>
-        </p:nvSpPr>
-        <p:spPr/>
-        <p:txBody>
-          <a:bodyPr>
-            <a:normAutofit/>
-          </a:bodyPr>
-          <a:lstStyle/>
-          <a:p>
-            <a:r>
-              <a:rPr lang="en-US" dirty="0"/>
-              <a:t>Digital Communications is Everywhere!</a:t>
-            </a:r>
-          </a:p>
-        </p:txBody>
-      </p:sp>
-      <p:sp>
-        <p:nvSpPr>
-          <p:cNvPr id="3" name="Slide Number Placeholder 2"/>
-          <p:cNvSpPr>
-            <a:spLocks noGrp="1"/>
-          </p:cNvSpPr>
-          <p:nvPr>
-            <p:ph type="sldNum" sz="quarter" idx="12"/>
-          </p:nvPr>
-        </p:nvSpPr>
-        <p:spPr/>
-        <p:txBody>
-          <a:bodyPr/>
-          <a:lstStyle/>
-          <a:p>
-            <a:fld id="{529F9F8D-2534-4D48-85E3-73908409BCC5}" type="slidenum">
-              <a:rPr lang="en-US" smtClean="0"/>
-              <a:pPr/>
-              <a:t>13</a:t>
             </a:fld>
             <a:endParaRPr lang="en-US"/>
           </a:p>
@@ -5586,6 +5257,161 @@
 </p:sld>
 </file>
 
+<file path=ppt/slides/slide13.xml><?xml version="1.0" encoding="utf-8"?>
+<p:sld xmlns:a="http://schemas.openxmlformats.org/drawingml/2006/main" xmlns:r="http://schemas.openxmlformats.org/officeDocument/2006/relationships" xmlns:p="http://schemas.openxmlformats.org/presentationml/2006/main">
+  <p:cSld>
+    <p:spTree>
+      <p:nvGrpSpPr>
+        <p:cNvPr id="1" name=""/>
+        <p:cNvGrpSpPr/>
+        <p:nvPr/>
+      </p:nvGrpSpPr>
+      <p:grpSpPr>
+        <a:xfrm>
+          <a:off x="0" y="0"/>
+          <a:ext cx="0" cy="0"/>
+          <a:chOff x="0" y="0"/>
+          <a:chExt cx="0" cy="0"/>
+        </a:xfrm>
+      </p:grpSpPr>
+      <p:sp>
+        <p:nvSpPr>
+          <p:cNvPr id="2" name="Title 1"/>
+          <p:cNvSpPr>
+            <a:spLocks noGrp="1"/>
+          </p:cNvSpPr>
+          <p:nvPr>
+            <p:ph type="title"/>
+          </p:nvPr>
+        </p:nvSpPr>
+        <p:spPr/>
+        <p:txBody>
+          <a:bodyPr>
+            <a:normAutofit/>
+          </a:bodyPr>
+          <a:lstStyle/>
+          <a:p>
+            <a:r>
+              <a:rPr lang="en-US" dirty="0"/>
+              <a:t>What do Communications Theorists Do?</a:t>
+            </a:r>
+          </a:p>
+        </p:txBody>
+      </p:sp>
+      <p:sp>
+        <p:nvSpPr>
+          <p:cNvPr id="3" name="Slide Number Placeholder 2"/>
+          <p:cNvSpPr>
+            <a:spLocks noGrp="1"/>
+          </p:cNvSpPr>
+          <p:nvPr>
+            <p:ph type="sldNum" sz="quarter" idx="12"/>
+          </p:nvPr>
+        </p:nvSpPr>
+        <p:spPr/>
+        <p:txBody>
+          <a:bodyPr/>
+          <a:lstStyle/>
+          <a:p>
+            <a:fld id="{529F9F8D-2534-4D48-85E3-73908409BCC5}" type="slidenum">
+              <a:rPr lang="en-US" smtClean="0"/>
+              <a:pPr/>
+              <a:t>13</a:t>
+            </a:fld>
+            <a:endParaRPr lang="en-US"/>
+          </a:p>
+        </p:txBody>
+      </p:sp>
+      <p:sp>
+        <p:nvSpPr>
+          <p:cNvPr id="4" name="Content Placeholder 3"/>
+          <p:cNvSpPr>
+            <a:spLocks noGrp="1"/>
+          </p:cNvSpPr>
+          <p:nvPr>
+            <p:ph sz="quarter" idx="1"/>
+          </p:nvPr>
+        </p:nvSpPr>
+        <p:spPr/>
+        <p:txBody>
+          <a:bodyPr/>
+          <a:lstStyle/>
+          <a:p>
+            <a:r>
+              <a:rPr lang="en-US" sz="2400" dirty="0"/>
+              <a:t>Try to make communication:</a:t>
+            </a:r>
+          </a:p>
+          <a:p>
+            <a:pPr lvl="1"/>
+            <a:r>
+              <a:rPr lang="en-US" sz="2000" dirty="0"/>
+              <a:t>Reliable, </a:t>
+            </a:r>
+          </a:p>
+          <a:p>
+            <a:pPr lvl="1"/>
+            <a:r>
+              <a:rPr lang="en-US" sz="2000" dirty="0"/>
+              <a:t>Fast, </a:t>
+            </a:r>
+          </a:p>
+          <a:p>
+            <a:pPr lvl="1"/>
+            <a:r>
+              <a:rPr lang="en-US" sz="2000" dirty="0"/>
+              <a:t>Cheap, …</a:t>
+            </a:r>
+          </a:p>
+          <a:p>
+            <a:pPr lvl="1"/>
+            <a:endParaRPr lang="en-US" sz="2000" dirty="0"/>
+          </a:p>
+          <a:p>
+            <a:r>
+              <a:rPr lang="en-US" sz="2400" dirty="0"/>
+              <a:t>Basic tools in this class:</a:t>
+            </a:r>
+          </a:p>
+          <a:p>
+            <a:pPr lvl="1"/>
+            <a:r>
+              <a:rPr lang="en-US" sz="2000" dirty="0"/>
+              <a:t>Look at point-to-point links.</a:t>
+            </a:r>
+          </a:p>
+          <a:p>
+            <a:pPr lvl="1"/>
+            <a:r>
+              <a:rPr lang="en-US" sz="2000" dirty="0"/>
+              <a:t>Model transmission and reception as a statistical estimation problem.</a:t>
+            </a:r>
+          </a:p>
+          <a:p>
+            <a:pPr lvl="1"/>
+            <a:r>
+              <a:rPr lang="en-US" sz="2000" dirty="0"/>
+              <a:t>Develop mathematical methods for good communication</a:t>
+            </a:r>
+          </a:p>
+          <a:p>
+            <a:pPr lvl="1"/>
+            <a:endParaRPr lang="en-US" sz="2000" dirty="0"/>
+          </a:p>
+          <a:p>
+            <a:pPr lvl="1"/>
+            <a:endParaRPr lang="en-US" dirty="0"/>
+          </a:p>
+        </p:txBody>
+      </p:sp>
+    </p:spTree>
+  </p:cSld>
+  <p:clrMapOvr>
+    <a:masterClrMapping/>
+  </p:clrMapOvr>
+</p:sld>
+</file>
+
 <file path=ppt/slides/slide14.xml><?xml version="1.0" encoding="utf-8"?>
 <p:sld xmlns:a="http://schemas.openxmlformats.org/drawingml/2006/main" xmlns:r="http://schemas.openxmlformats.org/officeDocument/2006/relationships" xmlns:p="http://schemas.openxmlformats.org/presentationml/2006/main">
   <p:cSld>
@@ -5615,21 +5441,96 @@
         </p:nvSpPr>
         <p:spPr/>
         <p:txBody>
-          <a:bodyPr>
-            <a:normAutofit/>
-          </a:bodyPr>
-          <a:lstStyle/>
-          <a:p>
-            <a:r>
-              <a:rPr lang="en-US" dirty="0"/>
-              <a:t>What do Communications Theorists Do?</a:t>
-            </a:r>
-          </a:p>
-        </p:txBody>
-      </p:sp>
-      <p:sp>
-        <p:nvSpPr>
-          <p:cNvPr id="3" name="Slide Number Placeholder 2"/>
+          <a:bodyPr/>
+          <a:lstStyle/>
+          <a:p>
+            <a:r>
+              <a:rPr lang="en-US" dirty="0"/>
+              <a:t>Course Learning Objectives</a:t>
+            </a:r>
+          </a:p>
+        </p:txBody>
+      </p:sp>
+      <p:sp>
+        <p:nvSpPr>
+          <p:cNvPr id="3" name="Content Placeholder 2"/>
+          <p:cNvSpPr>
+            <a:spLocks noGrp="1"/>
+          </p:cNvSpPr>
+          <p:nvPr>
+            <p:ph idx="1"/>
+          </p:nvPr>
+        </p:nvSpPr>
+        <p:spPr/>
+        <p:txBody>
+          <a:bodyPr/>
+          <a:lstStyle/>
+          <a:p>
+            <a:r>
+              <a:rPr lang="en-US" dirty="0"/>
+              <a:t>Mathematically describe the components of a basic communication link</a:t>
+            </a:r>
+          </a:p>
+          <a:p>
+            <a:pPr lvl="1"/>
+            <a:r>
+              <a:rPr lang="en-US" dirty="0"/>
+              <a:t>Mixing, filtering, symbol modulation, synchronization, equalization, channel coding, …</a:t>
+            </a:r>
+          </a:p>
+          <a:p>
+            <a:r>
+              <a:rPr lang="en-US" dirty="0"/>
+              <a:t>Simulate the system</a:t>
+            </a:r>
+          </a:p>
+          <a:p>
+            <a:r>
+              <a:rPr lang="en-US" dirty="0"/>
+              <a:t>Implement simple systems on software defined radios</a:t>
+            </a:r>
+          </a:p>
+          <a:p>
+            <a:r>
+              <a:rPr lang="en-US" dirty="0"/>
+              <a:t>Mathematical analyze the performance of the system</a:t>
+            </a:r>
+          </a:p>
+          <a:p>
+            <a:pPr lvl="1"/>
+            <a:r>
+              <a:rPr lang="en-US" dirty="0"/>
+              <a:t>Model impairments in the channel and devices</a:t>
+            </a:r>
+          </a:p>
+          <a:p>
+            <a:pPr lvl="1"/>
+            <a:r>
+              <a:rPr lang="en-US" dirty="0"/>
+              <a:t>Measure the performance such as bit error rate, power, …</a:t>
+            </a:r>
+          </a:p>
+          <a:p>
+            <a:r>
+              <a:rPr lang="en-US" dirty="0"/>
+              <a:t>Optimize the parameters of the design to maximize various performance metric</a:t>
+            </a:r>
+          </a:p>
+          <a:p>
+            <a:pPr lvl="1"/>
+            <a:r>
+              <a:rPr lang="en-US" dirty="0"/>
+              <a:t>Account for constraints such as power, complexity, …</a:t>
+            </a:r>
+          </a:p>
+          <a:p>
+            <a:endParaRPr lang="en-US" dirty="0"/>
+          </a:p>
+        </p:txBody>
+      </p:sp>
+      <p:sp>
+        <p:nvSpPr>
+          <p:cNvPr id="4" name="Slide Number Placeholder 3"/>
           <p:cNvSpPr>
             <a:spLocks noGrp="1"/>
           </p:cNvSpPr>
@@ -5642,98 +5543,20 @@
           <a:bodyPr/>
           <a:lstStyle/>
           <a:p>
-            <a:fld id="{529F9F8D-2534-4D48-85E3-73908409BCC5}" type="slidenum">
+            <a:fld id="{629637A9-119A-49DA-BD12-AAC58B377D80}" type="slidenum">
               <a:rPr lang="en-US" smtClean="0"/>
-              <a:pPr/>
               <a:t>14</a:t>
             </a:fld>
-            <a:endParaRPr lang="en-US"/>
-          </a:p>
-        </p:txBody>
-      </p:sp>
-      <p:sp>
-        <p:nvSpPr>
-          <p:cNvPr id="4" name="Content Placeholder 3"/>
-          <p:cNvSpPr>
-            <a:spLocks noGrp="1"/>
-          </p:cNvSpPr>
-          <p:nvPr>
-            <p:ph sz="quarter" idx="1"/>
-          </p:nvPr>
-        </p:nvSpPr>
-        <p:spPr/>
-        <p:txBody>
-          <a:bodyPr/>
-          <a:lstStyle/>
-          <a:p>
-            <a:r>
-              <a:rPr lang="en-US" sz="2400" dirty="0"/>
-              <a:t>Try to make communication:</a:t>
-            </a:r>
-          </a:p>
-          <a:p>
-            <a:pPr lvl="1"/>
-            <a:r>
-              <a:rPr lang="en-US" sz="2000" dirty="0"/>
-              <a:t>Reliable, </a:t>
-            </a:r>
-          </a:p>
-          <a:p>
-            <a:pPr lvl="1"/>
-            <a:r>
-              <a:rPr lang="en-US" sz="2000" dirty="0"/>
-              <a:t>Fast, </a:t>
-            </a:r>
-          </a:p>
-          <a:p>
-            <a:pPr lvl="1"/>
-            <a:r>
-              <a:rPr lang="en-US" sz="2000" dirty="0"/>
-              <a:t>Cheap, …</a:t>
-            </a:r>
-          </a:p>
-          <a:p>
-            <a:pPr lvl="1"/>
-            <a:endParaRPr lang="en-US" sz="2000" dirty="0"/>
-          </a:p>
-          <a:p>
-            <a:r>
-              <a:rPr lang="en-US" sz="2400" dirty="0"/>
-              <a:t>Basic tools in this class:</a:t>
-            </a:r>
-          </a:p>
-          <a:p>
-            <a:pPr lvl="1"/>
-            <a:r>
-              <a:rPr lang="en-US" sz="2000" dirty="0"/>
-              <a:t>Look at point-to-point links.</a:t>
-            </a:r>
-          </a:p>
-          <a:p>
-            <a:pPr lvl="1"/>
-            <a:r>
-              <a:rPr lang="en-US" sz="2000" dirty="0"/>
-              <a:t>Model transmission and reception as a statistical estimation problem.</a:t>
-            </a:r>
-          </a:p>
-          <a:p>
-            <a:pPr lvl="1"/>
-            <a:r>
-              <a:rPr lang="en-US" sz="2000" dirty="0"/>
-              <a:t>Develop mathematical methods for good communication</a:t>
-            </a:r>
-          </a:p>
-          <a:p>
-            <a:pPr lvl="1"/>
-            <a:endParaRPr lang="en-US" sz="2000" dirty="0"/>
-          </a:p>
-          <a:p>
-            <a:pPr lvl="1"/>
             <a:endParaRPr lang="en-US" dirty="0"/>
           </a:p>
         </p:txBody>
       </p:sp>
     </p:spTree>
+    <p:extLst>
+      <p:ext uri="{BB962C8B-B14F-4D97-AF65-F5344CB8AC3E}">
+        <p14:creationId xmlns:p14="http://schemas.microsoft.com/office/powerpoint/2010/main" val="3015967107"/>
+      </p:ext>
+    </p:extLst>
   </p:cSld>
   <p:clrMapOvr>
     <a:masterClrMapping/>
@@ -5760,158 +5583,6 @@
       </p:grpSpPr>
       <p:sp>
         <p:nvSpPr>
-          <p:cNvPr id="2" name="Title 1"/>
-          <p:cNvSpPr>
-            <a:spLocks noGrp="1"/>
-          </p:cNvSpPr>
-          <p:nvPr>
-            <p:ph type="title"/>
-          </p:nvPr>
-        </p:nvSpPr>
-        <p:spPr/>
-        <p:txBody>
-          <a:bodyPr/>
-          <a:lstStyle/>
-          <a:p>
-            <a:r>
-              <a:rPr lang="en-US" dirty="0"/>
-              <a:t>Course Learning Objectives</a:t>
-            </a:r>
-          </a:p>
-        </p:txBody>
-      </p:sp>
-      <p:sp>
-        <p:nvSpPr>
-          <p:cNvPr id="3" name="Content Placeholder 2"/>
-          <p:cNvSpPr>
-            <a:spLocks noGrp="1"/>
-          </p:cNvSpPr>
-          <p:nvPr>
-            <p:ph idx="1"/>
-          </p:nvPr>
-        </p:nvSpPr>
-        <p:spPr/>
-        <p:txBody>
-          <a:bodyPr/>
-          <a:lstStyle/>
-          <a:p>
-            <a:r>
-              <a:rPr lang="en-US" dirty="0"/>
-              <a:t>Mathematically describe the components of a basic communication link</a:t>
-            </a:r>
-          </a:p>
-          <a:p>
-            <a:pPr lvl="1"/>
-            <a:r>
-              <a:rPr lang="en-US" dirty="0"/>
-              <a:t>Mixing, filtering, symbol modulation, synchronization, equalization, channel coding, …</a:t>
-            </a:r>
-          </a:p>
-          <a:p>
-            <a:r>
-              <a:rPr lang="en-US" dirty="0"/>
-              <a:t>Simulate the system</a:t>
-            </a:r>
-          </a:p>
-          <a:p>
-            <a:r>
-              <a:rPr lang="en-US" dirty="0"/>
-              <a:t>Implement simple systems on software defined radios</a:t>
-            </a:r>
-          </a:p>
-          <a:p>
-            <a:r>
-              <a:rPr lang="en-US" dirty="0"/>
-              <a:t>Mathematical analyze the performance of the system</a:t>
-            </a:r>
-          </a:p>
-          <a:p>
-            <a:pPr lvl="1"/>
-            <a:r>
-              <a:rPr lang="en-US" dirty="0"/>
-              <a:t>Model impairments in the channel and devices</a:t>
-            </a:r>
-          </a:p>
-          <a:p>
-            <a:pPr lvl="1"/>
-            <a:r>
-              <a:rPr lang="en-US" dirty="0"/>
-              <a:t>Measure the performance such as bit error rate, power, …</a:t>
-            </a:r>
-          </a:p>
-          <a:p>
-            <a:r>
-              <a:rPr lang="en-US" dirty="0"/>
-              <a:t>Optimize the parameters of the design to maximize various performance metric</a:t>
-            </a:r>
-          </a:p>
-          <a:p>
-            <a:pPr lvl="1"/>
-            <a:r>
-              <a:rPr lang="en-US" dirty="0"/>
-              <a:t>Account for constraints such as power, complexity, …</a:t>
-            </a:r>
-          </a:p>
-          <a:p>
-            <a:endParaRPr lang="en-US" dirty="0"/>
-          </a:p>
-        </p:txBody>
-      </p:sp>
-      <p:sp>
-        <p:nvSpPr>
-          <p:cNvPr id="4" name="Slide Number Placeholder 3"/>
-          <p:cNvSpPr>
-            <a:spLocks noGrp="1"/>
-          </p:cNvSpPr>
-          <p:nvPr>
-            <p:ph type="sldNum" sz="quarter" idx="12"/>
-          </p:nvPr>
-        </p:nvSpPr>
-        <p:spPr/>
-        <p:txBody>
-          <a:bodyPr/>
-          <a:lstStyle/>
-          <a:p>
-            <a:fld id="{629637A9-119A-49DA-BD12-AAC58B377D80}" type="slidenum">
-              <a:rPr lang="en-US" smtClean="0"/>
-              <a:t>15</a:t>
-            </a:fld>
-            <a:endParaRPr lang="en-US" dirty="0"/>
-          </a:p>
-        </p:txBody>
-      </p:sp>
-    </p:spTree>
-    <p:extLst>
-      <p:ext uri="{BB962C8B-B14F-4D97-AF65-F5344CB8AC3E}">
-        <p14:creationId xmlns:p14="http://schemas.microsoft.com/office/powerpoint/2010/main" val="3015967107"/>
-      </p:ext>
-    </p:extLst>
-  </p:cSld>
-  <p:clrMapOvr>
-    <a:masterClrMapping/>
-  </p:clrMapOvr>
-</p:sld>
-</file>
-
-<file path=ppt/slides/slide16.xml><?xml version="1.0" encoding="utf-8"?>
-<p:sld xmlns:a="http://schemas.openxmlformats.org/drawingml/2006/main" xmlns:r="http://schemas.openxmlformats.org/officeDocument/2006/relationships" xmlns:p="http://schemas.openxmlformats.org/presentationml/2006/main">
-  <p:cSld>
-    <p:spTree>
-      <p:nvGrpSpPr>
-        <p:cNvPr id="1" name=""/>
-        <p:cNvGrpSpPr/>
-        <p:nvPr/>
-      </p:nvGrpSpPr>
-      <p:grpSpPr>
-        <a:xfrm>
-          <a:off x="0" y="0"/>
-          <a:ext cx="0" cy="0"/>
-          <a:chOff x="0" y="0"/>
-          <a:chExt cx="0" cy="0"/>
-        </a:xfrm>
-      </p:grpSpPr>
-      <p:sp>
-        <p:nvSpPr>
           <p:cNvPr id="2" name="Title 1">
             <a:extLst>
               <a:ext uri="{FF2B5EF4-FFF2-40B4-BE49-F238E27FC236}">
@@ -5961,7 +5632,7 @@
           <a:p>
             <a:fld id="{629637A9-119A-49DA-BD12-AAC58B377D80}" type="slidenum">
               <a:rPr lang="en-US" smtClean="0"/>
-              <a:t>16</a:t>
+              <a:t>15</a:t>
             </a:fld>
             <a:endParaRPr lang="en-US" dirty="0"/>
           </a:p>
@@ -5969,10 +5640,10 @@
       </p:sp>
       <p:pic>
         <p:nvPicPr>
-          <p:cNvPr id="5" name="Picture 4">
+          <p:cNvPr id="7" name="Picture 6">
             <a:extLst>
               <a:ext uri="{FF2B5EF4-FFF2-40B4-BE49-F238E27FC236}">
-                <a16:creationId xmlns:a16="http://schemas.microsoft.com/office/drawing/2014/main" id="{CDA36800-B152-4B4E-9BD3-B42F08678D18}"/>
+                <a16:creationId xmlns:a16="http://schemas.microsoft.com/office/drawing/2014/main" id="{6009868B-DED9-7116-C013-AA3FE2F663EA}"/>
               </a:ext>
             </a:extLst>
           </p:cNvPr>
@@ -5989,38 +5660,8 @@
         </p:blipFill>
         <p:spPr>
           <a:xfrm>
-            <a:off x="1097280" y="1467970"/>
-            <a:ext cx="7282809" cy="2156012"/>
-          </a:xfrm>
-          <a:prstGeom prst="rect">
-            <a:avLst/>
-          </a:prstGeom>
-        </p:spPr>
-      </p:pic>
-      <p:pic>
-        <p:nvPicPr>
-          <p:cNvPr id="6" name="Picture 5">
-            <a:extLst>
-              <a:ext uri="{FF2B5EF4-FFF2-40B4-BE49-F238E27FC236}">
-                <a16:creationId xmlns:a16="http://schemas.microsoft.com/office/drawing/2014/main" id="{4A7D3576-AFCC-435D-BAA7-940CA04A2966}"/>
-              </a:ext>
-            </a:extLst>
-          </p:cNvPr>
-          <p:cNvPicPr>
-            <a:picLocks noChangeAspect="1"/>
-          </p:cNvPicPr>
-          <p:nvPr/>
-        </p:nvPicPr>
-        <p:blipFill>
-          <a:blip r:embed="rId3"/>
-          <a:stretch>
-            <a:fillRect/>
-          </a:stretch>
-        </p:blipFill>
-        <p:spPr>
-          <a:xfrm>
-            <a:off x="1204856" y="4084957"/>
-            <a:ext cx="7125597" cy="1173040"/>
+            <a:off x="1787428" y="1710406"/>
+            <a:ext cx="8439060" cy="4088721"/>
           </a:xfrm>
           <a:prstGeom prst="rect">
             <a:avLst/>
@@ -6125,14 +5766,14 @@
             <a:pPr lvl="1"/>
             <a:r>
               <a:rPr lang="en-US" dirty="0"/>
-              <a:t>370 Jay St, 9.104</a:t>
+              <a:t>370 Jay St, Room 901</a:t>
             </a:r>
           </a:p>
           <a:p>
             <a:pPr lvl="1"/>
             <a:r>
               <a:rPr lang="en-US" dirty="0"/>
-              <a:t>Office Hours:  Thursdays, 2-4 pm</a:t>
+              <a:t>Office Hours:  Mondays, 10-11:30am</a:t>
             </a:r>
           </a:p>
           <a:p>
@@ -6145,14 +5786,13 @@
               <a:t>TA:  </a:t>
             </a:r>
             <a:r>
-              <a:rPr lang="en-US" b="0" i="0" dirty="0">
+              <a:rPr lang="en-US" dirty="0">
                 <a:solidFill>
                   <a:srgbClr val="202124"/>
                 </a:solidFill>
-                <a:effectLst/>
                 <a:latin typeface="Google Sans"/>
               </a:rPr>
-              <a:t>Ruth Gebremedhin</a:t>
+              <a:t>TBD</a:t>
             </a:r>
             <a:endParaRPr lang="de-DE" dirty="0"/>
           </a:p>
@@ -6173,14 +5813,14 @@
           <a:p>
             <a:r>
               <a:rPr lang="de-DE" dirty="0"/>
-              <a:t>Location:  Rogers Hall 204</a:t>
+              <a:t>Location:  370 Jay St, Room 407</a:t>
             </a:r>
           </a:p>
           <a:p>
             <a:pPr lvl="1"/>
             <a:r>
               <a:rPr lang="de-DE" dirty="0"/>
-              <a:t>Tuesdays, 5 to 7:30pm</a:t>
+              <a:t>Tuesdays, 6:30 to 9pm</a:t>
             </a:r>
           </a:p>
           <a:p>
@@ -9124,7 +8764,7 @@
           <p:nvPr>
             <p:extLst>
               <p:ext uri="{D42A27DB-BD31-4B8C-83A1-F6EECF244321}">
-                <p14:modId xmlns:p14="http://schemas.microsoft.com/office/powerpoint/2010/main" val="1987079482"/>
+                <p14:modId xmlns:p14="http://schemas.microsoft.com/office/powerpoint/2010/main" val="1023525559"/>
               </p:ext>
             </p:extLst>
           </p:nvPr>
@@ -9188,7 +8828,14 @@
                       </a:r>
                     </a:p>
                   </a:txBody>
-                  <a:tcPr marL="5443" marR="5443" marT="5443" marB="0"/>
+                  <a:tcPr marL="5443" marR="5443" marT="5443" marB="0">
+                    <a:solidFill>
+                      <a:schemeClr val="accent1">
+                        <a:lumMod val="40000"/>
+                        <a:lumOff val="60000"/>
+                      </a:schemeClr>
+                    </a:solidFill>
+                  </a:tcPr>
                 </a:tc>
                 <a:tc>
                   <a:txBody>
@@ -9197,7 +8844,7 @@
                     <a:p>
                       <a:pPr algn="ctr" fontAlgn="t"/>
                       <a:r>
-                        <a:rPr lang="en-US" sz="1400" b="0" i="0" u="none" strike="noStrike">
+                        <a:rPr lang="en-US" sz="1400" b="0" i="0" u="none" strike="noStrike" dirty="0">
                           <a:solidFill>
                             <a:srgbClr val="000000"/>
                           </a:solidFill>
@@ -9208,7 +8855,14 @@
                       </a:r>
                     </a:p>
                   </a:txBody>
-                  <a:tcPr marL="5443" marR="5443" marT="5443" marB="0"/>
+                  <a:tcPr marL="5443" marR="5443" marT="5443" marB="0">
+                    <a:solidFill>
+                      <a:schemeClr val="accent1">
+                        <a:lumMod val="40000"/>
+                        <a:lumOff val="60000"/>
+                      </a:schemeClr>
+                    </a:solidFill>
+                  </a:tcPr>
                 </a:tc>
                 <a:tc>
                   <a:txBody>
@@ -9228,7 +8882,14 @@
                       </a:r>
                     </a:p>
                   </a:txBody>
-                  <a:tcPr marL="5443" marR="5443" marT="5443" marB="0"/>
+                  <a:tcPr marL="5443" marR="5443" marT="5443" marB="0">
+                    <a:solidFill>
+                      <a:schemeClr val="accent1">
+                        <a:lumMod val="40000"/>
+                        <a:lumOff val="60000"/>
+                      </a:schemeClr>
+                    </a:solidFill>
+                  </a:tcPr>
                 </a:tc>
                 <a:tc>
                   <a:txBody>
@@ -9248,7 +8909,14 @@
                       </a:r>
                     </a:p>
                   </a:txBody>
-                  <a:tcPr marL="5443" marR="5443" marT="5443" marB="0"/>
+                  <a:tcPr marL="5443" marR="5443" marT="5443" marB="0">
+                    <a:solidFill>
+                      <a:schemeClr val="accent1">
+                        <a:lumMod val="40000"/>
+                        <a:lumOff val="60000"/>
+                      </a:schemeClr>
+                    </a:solidFill>
+                  </a:tcPr>
                 </a:tc>
                 <a:extLst>
                   <a:ext uri="{0D108BD9-81ED-4DB2-BD59-A6C34878D82A}">
@@ -9284,14 +8952,14 @@
                     <a:p>
                       <a:pPr algn="r" fontAlgn="t"/>
                       <a:r>
-                        <a:rPr lang="en-US" sz="1400" b="0" i="0" u="none" strike="noStrike">
+                        <a:rPr lang="en-US" sz="1400" b="0" i="0" u="none" strike="noStrike" dirty="0">
                           <a:solidFill>
                             <a:srgbClr val="000000"/>
                           </a:solidFill>
                           <a:effectLst/>
                           <a:latin typeface="Calibri" panose="020F0502020204030204" pitchFamily="34" charset="0"/>
                         </a:rPr>
-                        <a:t>9/6/2022</a:t>
+                        <a:t>9/5/2022</a:t>
                       </a:r>
                     </a:p>
                   </a:txBody>
@@ -9390,14 +9058,14 @@
                     <a:p>
                       <a:pPr algn="r" fontAlgn="t"/>
                       <a:r>
-                        <a:rPr lang="en-US" sz="1400" b="0" i="0" u="none" strike="noStrike">
+                        <a:rPr lang="en-US" sz="1400" b="0" i="0" u="none" strike="noStrike" dirty="0">
                           <a:solidFill>
                             <a:srgbClr val="000000"/>
                           </a:solidFill>
                           <a:effectLst/>
                           <a:latin typeface="Calibri" panose="020F0502020204030204" pitchFamily="34" charset="0"/>
                         </a:rPr>
-                        <a:t>9/13/2022</a:t>
+                        <a:t>9/12/2022</a:t>
                       </a:r>
                     </a:p>
                   </a:txBody>
@@ -9477,14 +9145,14 @@
                     <a:p>
                       <a:pPr algn="r" fontAlgn="t"/>
                       <a:r>
-                        <a:rPr lang="en-US" sz="1400" b="0" i="0" u="none" strike="noStrike">
+                        <a:rPr lang="en-US" sz="1400" b="0" i="0" u="none" strike="noStrike" dirty="0">
                           <a:solidFill>
                             <a:srgbClr val="000000"/>
                           </a:solidFill>
                           <a:effectLst/>
                           <a:latin typeface="Calibri" panose="020F0502020204030204" pitchFamily="34" charset="0"/>
                         </a:rPr>
-                        <a:t>9/20/2022</a:t>
+                        <a:t>9/19/2022</a:t>
                       </a:r>
                     </a:p>
                   </a:txBody>
@@ -9571,7 +9239,7 @@
                           <a:effectLst/>
                           <a:latin typeface="Calibri" panose="020F0502020204030204" pitchFamily="34" charset="0"/>
                         </a:rPr>
-                        <a:t>9/27/2022</a:t>
+                        <a:t>9/26/2022</a:t>
                       </a:r>
                     </a:p>
                   </a:txBody>
@@ -9658,7 +9326,7 @@
                           <a:effectLst/>
                           <a:latin typeface="Calibri" panose="020F0502020204030204" pitchFamily="34" charset="0"/>
                         </a:rPr>
-                        <a:t>10/4/2022</a:t>
+                        <a:t>10/3/2022</a:t>
                       </a:r>
                     </a:p>
                   </a:txBody>
@@ -9745,7 +9413,7 @@
                           <a:effectLst/>
                           <a:latin typeface="Calibri" panose="020F0502020204030204" pitchFamily="34" charset="0"/>
                         </a:rPr>
-                        <a:t>10/11/2022</a:t>
+                        <a:t>10/10/2022</a:t>
                       </a:r>
                     </a:p>
                   </a:txBody>
@@ -9825,14 +9493,14 @@
                     <a:p>
                       <a:pPr algn="r" fontAlgn="t"/>
                       <a:r>
-                        <a:rPr lang="en-US" sz="1400" b="0" i="0" u="none" strike="noStrike">
+                        <a:rPr lang="en-US" sz="1400" b="0" i="0" u="none" strike="noStrike" dirty="0">
                           <a:solidFill>
                             <a:srgbClr val="000000"/>
                           </a:solidFill>
                           <a:effectLst/>
                           <a:latin typeface="Calibri" panose="020F0502020204030204" pitchFamily="34" charset="0"/>
                         </a:rPr>
-                        <a:t>10/18/2022</a:t>
+                        <a:t>10/17/2022</a:t>
                       </a:r>
                     </a:p>
                   </a:txBody>
@@ -9912,14 +9580,14 @@
                     <a:p>
                       <a:pPr algn="r" fontAlgn="t"/>
                       <a:r>
-                        <a:rPr lang="en-US" sz="1400" b="0" i="0" u="none" strike="noStrike">
+                        <a:rPr lang="en-US" sz="1400" b="0" i="0" u="none" strike="noStrike" dirty="0">
                           <a:solidFill>
                             <a:srgbClr val="000000"/>
                           </a:solidFill>
                           <a:effectLst/>
                           <a:latin typeface="Calibri" panose="020F0502020204030204" pitchFamily="34" charset="0"/>
                         </a:rPr>
-                        <a:t>10/25/2022</a:t>
+                        <a:t>10/24/2022</a:t>
                       </a:r>
                     </a:p>
                   </a:txBody>
@@ -9999,14 +9667,14 @@
                     <a:p>
                       <a:pPr algn="r" fontAlgn="t"/>
                       <a:r>
-                        <a:rPr lang="en-US" sz="1400" b="0" i="0" u="none" strike="noStrike">
+                        <a:rPr lang="en-US" sz="1400" b="0" i="0" u="none" strike="noStrike" dirty="0">
                           <a:solidFill>
                             <a:srgbClr val="000000"/>
                           </a:solidFill>
                           <a:effectLst/>
                           <a:latin typeface="Calibri" panose="020F0502020204030204" pitchFamily="34" charset="0"/>
                         </a:rPr>
-                        <a:t>11/1/2022</a:t>
+                        <a:t>10/31/2022</a:t>
                       </a:r>
                     </a:p>
                   </a:txBody>
@@ -10086,14 +9754,14 @@
                     <a:p>
                       <a:pPr algn="r" fontAlgn="t"/>
                       <a:r>
-                        <a:rPr lang="en-US" sz="1400" b="0" i="0" u="none" strike="noStrike">
+                        <a:rPr lang="en-US" sz="1400" b="0" i="0" u="none" strike="noStrike" dirty="0">
                           <a:solidFill>
                             <a:srgbClr val="000000"/>
                           </a:solidFill>
                           <a:effectLst/>
                           <a:latin typeface="Calibri" panose="020F0502020204030204" pitchFamily="34" charset="0"/>
                         </a:rPr>
-                        <a:t>11/8/2022</a:t>
+                        <a:t>11/7/2022</a:t>
                       </a:r>
                     </a:p>
                   </a:txBody>
@@ -10173,14 +9841,14 @@
                     <a:p>
                       <a:pPr algn="r" fontAlgn="t"/>
                       <a:r>
-                        <a:rPr lang="en-US" sz="1400" b="0" i="0" u="none" strike="noStrike">
+                        <a:rPr lang="en-US" sz="1400" b="0" i="0" u="none" strike="noStrike" dirty="0">
                           <a:solidFill>
                             <a:srgbClr val="000000"/>
                           </a:solidFill>
                           <a:effectLst/>
                           <a:latin typeface="Calibri" panose="020F0502020204030204" pitchFamily="34" charset="0"/>
                         </a:rPr>
-                        <a:t>11/15/2022</a:t>
+                        <a:t>11/14/2022</a:t>
                       </a:r>
                     </a:p>
                   </a:txBody>
@@ -10260,14 +9928,14 @@
                     <a:p>
                       <a:pPr algn="r" fontAlgn="t"/>
                       <a:r>
-                        <a:rPr lang="en-US" sz="1400" b="0" i="0" u="none" strike="noStrike">
+                        <a:rPr lang="en-US" sz="1400" b="0" i="0" u="none" strike="noStrike" dirty="0">
                           <a:solidFill>
                             <a:srgbClr val="000000"/>
                           </a:solidFill>
                           <a:effectLst/>
                           <a:latin typeface="Calibri" panose="020F0502020204030204" pitchFamily="34" charset="0"/>
                         </a:rPr>
-                        <a:t>11/22/2022</a:t>
+                        <a:t>11/21/2022</a:t>
                       </a:r>
                     </a:p>
                   </a:txBody>
@@ -10344,14 +10012,14 @@
                     <a:p>
                       <a:pPr algn="r" fontAlgn="t"/>
                       <a:r>
-                        <a:rPr lang="en-US" sz="1400" b="0" i="0" u="none" strike="noStrike">
+                        <a:rPr lang="en-US" sz="1400" b="0" i="0" u="none" strike="noStrike" dirty="0">
                           <a:solidFill>
                             <a:srgbClr val="000000"/>
                           </a:solidFill>
                           <a:effectLst/>
                           <a:latin typeface="Calibri" panose="020F0502020204030204" pitchFamily="34" charset="0"/>
                         </a:rPr>
-                        <a:t>11/29/2022</a:t>
+                        <a:t>11/28/2022</a:t>
                       </a:r>
                     </a:p>
                   </a:txBody>
@@ -10431,14 +10099,14 @@
                     <a:p>
                       <a:pPr algn="r" fontAlgn="t"/>
                       <a:r>
-                        <a:rPr lang="en-US" sz="1400" b="0" i="0" u="none" strike="noStrike">
+                        <a:rPr lang="en-US" sz="1400" b="0" i="0" u="none" strike="noStrike" dirty="0">
                           <a:solidFill>
                             <a:srgbClr val="000000"/>
                           </a:solidFill>
                           <a:effectLst/>
                           <a:latin typeface="Calibri" panose="020F0502020204030204" pitchFamily="34" charset="0"/>
                         </a:rPr>
-                        <a:t>12/6/2022</a:t>
+                        <a:t>12/5/2022</a:t>
                       </a:r>
                     </a:p>
                   </a:txBody>
@@ -10518,14 +10186,14 @@
                     <a:p>
                       <a:pPr algn="r" fontAlgn="t"/>
                       <a:r>
-                        <a:rPr lang="en-US" sz="1400" b="0" i="0" u="none" strike="noStrike">
+                        <a:rPr lang="en-US" sz="1400" b="0" i="0" u="none" strike="noStrike" dirty="0">
                           <a:solidFill>
                             <a:srgbClr val="000000"/>
                           </a:solidFill>
                           <a:effectLst/>
                           <a:latin typeface="Calibri" panose="020F0502020204030204" pitchFamily="34" charset="0"/>
                         </a:rPr>
-                        <a:t>12/13/2022</a:t>
+                        <a:t>12/12/2022</a:t>
                       </a:r>
                     </a:p>
                   </a:txBody>
@@ -10703,7 +10371,7 @@
             <a:pPr lvl="1"/>
             <a:r>
               <a:rPr lang="en-US" dirty="0"/>
-              <a:t>MATLAB exercises</a:t>
+              <a:t>MATLAB exercises </a:t>
             </a:r>
           </a:p>
           <a:p>

</xml_diff>